<commit_message>
simplified Schema (no pull-down R)
</commit_message>
<xml_diff>
--- a/Ampelsteuerung.pptx
+++ b/Ampelsteuerung.pptx
@@ -5,8 +5,7 @@
     <p:sldMasterId id="2147483648" r:id="rId1"/>
   </p:sldMasterIdLst>
   <p:sldIdLst>
-    <p:sldId id="256" r:id="rId2"/>
-    <p:sldId id="257" r:id="rId3"/>
+    <p:sldId id="257" r:id="rId2"/>
   </p:sldIdLst>
   <p:sldSz cx="12192000" cy="6858000"/>
   <p:notesSz cx="6858000" cy="9144000"/>
@@ -105,6 +104,11 @@
       </a:defRPr>
     </a:lvl9pPr>
   </p:defaultTextStyle>
+  <p:extLst>
+    <p:ext uri="{EFAFB233-063F-42B5-8137-9DF3F51BA10A}">
+      <p15:sldGuideLst xmlns:p15="http://schemas.microsoft.com/office/powerpoint/2012/main"/>
+    </p:ext>
+  </p:extLst>
 </p:presentation>
 </file>
 
@@ -3343,98 +3347,12 @@
           <a:chExt cx="0" cy="0"/>
         </a:xfrm>
       </p:grpSpPr>
-      <p:sp>
-        <p:nvSpPr>
-          <p:cNvPr id="2" name="Titel 1">
-            <a:extLst>
-              <a:ext uri="{FF2B5EF4-FFF2-40B4-BE49-F238E27FC236}">
-                <a16:creationId xmlns:a16="http://schemas.microsoft.com/office/drawing/2014/main" id="{2C0A7B04-5F30-4D21-A340-58F5F184AB71}"/>
-              </a:ext>
-            </a:extLst>
-          </p:cNvPr>
-          <p:cNvSpPr>
-            <a:spLocks noGrp="1"/>
-          </p:cNvSpPr>
-          <p:nvPr>
-            <p:ph type="ctrTitle"/>
-          </p:nvPr>
-        </p:nvSpPr>
-        <p:spPr/>
-        <p:txBody>
-          <a:bodyPr/>
-          <a:lstStyle/>
-          <a:p>
-            <a:r>
-              <a:rPr lang="de-CH" dirty="0"/>
-              <a:t>Ampelsteuerung</a:t>
-            </a:r>
-          </a:p>
-        </p:txBody>
-      </p:sp>
-      <p:sp>
-        <p:nvSpPr>
-          <p:cNvPr id="3" name="Untertitel 2">
-            <a:extLst>
-              <a:ext uri="{FF2B5EF4-FFF2-40B4-BE49-F238E27FC236}">
-                <a16:creationId xmlns:a16="http://schemas.microsoft.com/office/drawing/2014/main" id="{181638F9-28A3-4757-B71E-1DFC9DA93E76}"/>
-              </a:ext>
-            </a:extLst>
-          </p:cNvPr>
-          <p:cNvSpPr>
-            <a:spLocks noGrp="1"/>
-          </p:cNvSpPr>
-          <p:nvPr>
-            <p:ph type="subTitle" idx="1"/>
-          </p:nvPr>
-        </p:nvSpPr>
-        <p:spPr/>
-        <p:txBody>
-          <a:bodyPr/>
-          <a:lstStyle/>
-          <a:p>
-            <a:r>
-              <a:rPr lang="de-CH" dirty="0"/>
-              <a:t>mit Arduino</a:t>
-            </a:r>
-          </a:p>
-        </p:txBody>
-      </p:sp>
-    </p:spTree>
-    <p:extLst>
-      <p:ext uri="{BB962C8B-B14F-4D97-AF65-F5344CB8AC3E}">
-        <p14:creationId xmlns:p14="http://schemas.microsoft.com/office/powerpoint/2010/main" val="3492592737"/>
-      </p:ext>
-    </p:extLst>
-  </p:cSld>
-  <p:clrMapOvr>
-    <a:masterClrMapping/>
-  </p:clrMapOvr>
-</p:sld>
-</file>
-
-<file path=ppt/slides/slide2.xml><?xml version="1.0" encoding="utf-8"?>
-<p:sld xmlns:a="http://schemas.openxmlformats.org/drawingml/2006/main" xmlns:r="http://schemas.openxmlformats.org/officeDocument/2006/relationships" xmlns:p="http://schemas.openxmlformats.org/presentationml/2006/main">
-  <p:cSld>
-    <p:spTree>
-      <p:nvGrpSpPr>
-        <p:cNvPr id="1" name=""/>
-        <p:cNvGrpSpPr/>
-        <p:nvPr/>
-      </p:nvGrpSpPr>
-      <p:grpSpPr>
-        <a:xfrm>
-          <a:off x="0" y="0"/>
-          <a:ext cx="0" cy="0"/>
-          <a:chOff x="0" y="0"/>
-          <a:chExt cx="0" cy="0"/>
-        </a:xfrm>
-      </p:grpSpPr>
       <p:pic>
         <p:nvPicPr>
-          <p:cNvPr id="134" name="Grafik 133">
-            <a:extLst>
-              <a:ext uri="{FF2B5EF4-FFF2-40B4-BE49-F238E27FC236}">
-                <a16:creationId xmlns:a16="http://schemas.microsoft.com/office/drawing/2014/main" id="{15AF0BB2-0E2D-4751-9E61-9639222E70E6}"/>
+          <p:cNvPr id="4" name="Grafik 3">
+            <a:extLst>
+              <a:ext uri="{FF2B5EF4-FFF2-40B4-BE49-F238E27FC236}">
+                <a16:creationId xmlns:a16="http://schemas.microsoft.com/office/drawing/2014/main" id="{3A0C712C-25E9-43EB-A570-9C810E2692F1}"/>
               </a:ext>
             </a:extLst>
           </p:cNvPr>
@@ -3451,37 +3369,7 @@
         </p:blipFill>
         <p:spPr>
           <a:xfrm>
-            <a:off x="7820063" y="3025820"/>
-            <a:ext cx="957086" cy="429867"/>
-          </a:xfrm>
-          <a:prstGeom prst="rect">
-            <a:avLst/>
-          </a:prstGeom>
-        </p:spPr>
-      </p:pic>
-      <p:pic>
-        <p:nvPicPr>
-          <p:cNvPr id="4" name="Grafik 3">
-            <a:extLst>
-              <a:ext uri="{FF2B5EF4-FFF2-40B4-BE49-F238E27FC236}">
-                <a16:creationId xmlns:a16="http://schemas.microsoft.com/office/drawing/2014/main" id="{3A0C712C-25E9-43EB-A570-9C810E2692F1}"/>
-              </a:ext>
-            </a:extLst>
-          </p:cNvPr>
-          <p:cNvPicPr>
-            <a:picLocks noChangeAspect="1"/>
-          </p:cNvPicPr>
-          <p:nvPr/>
-        </p:nvPicPr>
-        <p:blipFill>
-          <a:blip r:embed="rId2"/>
-          <a:stretch>
-            <a:fillRect/>
-          </a:stretch>
-        </p:blipFill>
-        <p:spPr>
-          <a:xfrm>
-            <a:off x="7820063" y="1263304"/>
+            <a:off x="4690783" y="1507144"/>
             <a:ext cx="957086" cy="429867"/>
           </a:xfrm>
           <a:prstGeom prst="rect">
@@ -3520,7 +3408,7 @@
         </p:blipFill>
         <p:spPr bwMode="auto">
           <a:xfrm rot="10800000">
-            <a:off x="5005888" y="2035449"/>
+            <a:off x="1876608" y="2279289"/>
             <a:ext cx="2163280" cy="2163280"/>
           </a:xfrm>
           <a:prstGeom prst="rect">
@@ -3567,7 +3455,7 @@
         </p:blipFill>
         <p:spPr bwMode="auto">
           <a:xfrm rot="5400000">
-            <a:off x="8764411" y="1360873"/>
+            <a:off x="5635131" y="1604713"/>
             <a:ext cx="979840" cy="954364"/>
           </a:xfrm>
           <a:prstGeom prst="rect">
@@ -3614,7 +3502,7 @@
         </p:blipFill>
         <p:spPr bwMode="auto">
           <a:xfrm rot="5400000">
-            <a:off x="8764411" y="3691047"/>
+            <a:off x="5635131" y="3934887"/>
             <a:ext cx="979840" cy="954364"/>
           </a:xfrm>
           <a:prstGeom prst="rect">
@@ -3654,7 +3542,7 @@
         </p:blipFill>
         <p:spPr>
           <a:xfrm>
-            <a:off x="7820063" y="1586602"/>
+            <a:off x="4690783" y="1830442"/>
             <a:ext cx="957086" cy="429867"/>
           </a:xfrm>
           <a:prstGeom prst="rect">
@@ -3684,7 +3572,7 @@
         </p:blipFill>
         <p:spPr>
           <a:xfrm>
-            <a:off x="7820063" y="1895616"/>
+            <a:off x="4690783" y="2139456"/>
             <a:ext cx="957086" cy="429867"/>
           </a:xfrm>
           <a:prstGeom prst="rect">
@@ -3706,7 +3594,7 @@
         </p:nvCxnSpPr>
         <p:spPr>
           <a:xfrm>
-            <a:off x="8525565" y="1504118"/>
+            <a:off x="5396285" y="1747958"/>
             <a:ext cx="587513" cy="0"/>
           </a:xfrm>
           <a:prstGeom prst="line">
@@ -3749,7 +3637,7 @@
         </p:nvCxnSpPr>
         <p:spPr>
           <a:xfrm>
-            <a:off x="8557315" y="1827960"/>
+            <a:off x="5428035" y="2071800"/>
             <a:ext cx="587513" cy="0"/>
           </a:xfrm>
           <a:prstGeom prst="line">
@@ -3792,7 +3680,7 @@
         </p:nvCxnSpPr>
         <p:spPr>
           <a:xfrm>
-            <a:off x="8557315" y="2137524"/>
+            <a:off x="5428035" y="2381364"/>
             <a:ext cx="587513" cy="0"/>
           </a:xfrm>
           <a:prstGeom prst="line">
@@ -3837,7 +3725,7 @@
         </p:nvCxnSpPr>
         <p:spPr>
           <a:xfrm flipH="1">
-            <a:off x="8846928" y="1551117"/>
+            <a:off x="5717648" y="1794957"/>
             <a:ext cx="4143" cy="1261019"/>
           </a:xfrm>
           <a:prstGeom prst="line">
@@ -3880,7 +3768,7 @@
         </p:nvSpPr>
         <p:spPr>
           <a:xfrm>
-            <a:off x="8826623" y="1850181"/>
+            <a:off x="5697343" y="2094021"/>
             <a:ext cx="45719" cy="45719"/>
           </a:xfrm>
           <a:prstGeom prst="ellipse">
@@ -3938,7 +3826,7 @@
         </p:nvSpPr>
         <p:spPr>
           <a:xfrm>
-            <a:off x="8824069" y="2164860"/>
+            <a:off x="5694789" y="2408700"/>
             <a:ext cx="45719" cy="45719"/>
           </a:xfrm>
           <a:prstGeom prst="ellipse">
@@ -3998,7 +3886,7 @@
         </p:nvCxnSpPr>
         <p:spPr>
           <a:xfrm>
-            <a:off x="8846928" y="1551117"/>
+            <a:off x="5717648" y="1794957"/>
             <a:ext cx="266150" cy="0"/>
           </a:xfrm>
           <a:prstGeom prst="line">
@@ -4044,7 +3932,7 @@
         </p:nvCxnSpPr>
         <p:spPr>
           <a:xfrm>
-            <a:off x="8872342" y="1873041"/>
+            <a:off x="5743062" y="2116881"/>
             <a:ext cx="272486" cy="128"/>
           </a:xfrm>
           <a:prstGeom prst="line">
@@ -4090,7 +3978,7 @@
         </p:nvCxnSpPr>
         <p:spPr>
           <a:xfrm>
-            <a:off x="8869788" y="2187720"/>
+            <a:off x="5740508" y="2431560"/>
             <a:ext cx="275040" cy="128"/>
           </a:xfrm>
           <a:prstGeom prst="line">
@@ -4135,7 +4023,7 @@
         </p:nvCxnSpPr>
         <p:spPr>
           <a:xfrm>
-            <a:off x="6543994" y="3420534"/>
+            <a:off x="3414714" y="3664374"/>
             <a:ext cx="2297961" cy="0"/>
           </a:xfrm>
           <a:prstGeom prst="line">
@@ -4186,7 +4074,7 @@
         </p:blipFill>
         <p:spPr>
           <a:xfrm>
-            <a:off x="7820063" y="3593227"/>
+            <a:off x="4690783" y="3837067"/>
             <a:ext cx="957086" cy="429867"/>
           </a:xfrm>
           <a:prstGeom prst="rect">
@@ -4216,7 +4104,7 @@
         </p:blipFill>
         <p:spPr>
           <a:xfrm>
-            <a:off x="7820063" y="3912291"/>
+            <a:off x="4690783" y="4156131"/>
             <a:ext cx="957086" cy="429867"/>
           </a:xfrm>
           <a:prstGeom prst="rect">
@@ -4246,7 +4134,7 @@
         </p:blipFill>
         <p:spPr>
           <a:xfrm>
-            <a:off x="7820063" y="4225539"/>
+            <a:off x="4690783" y="4469379"/>
             <a:ext cx="957086" cy="429867"/>
           </a:xfrm>
           <a:prstGeom prst="rect">
@@ -4268,7 +4156,7 @@
         </p:nvCxnSpPr>
         <p:spPr>
           <a:xfrm>
-            <a:off x="8525565" y="3829807"/>
+            <a:off x="5396285" y="4073647"/>
             <a:ext cx="587513" cy="0"/>
           </a:xfrm>
           <a:prstGeom prst="line">
@@ -4311,7 +4199,7 @@
         </p:nvCxnSpPr>
         <p:spPr>
           <a:xfrm>
-            <a:off x="8557315" y="4153649"/>
+            <a:off x="5428035" y="4397489"/>
             <a:ext cx="587513" cy="0"/>
           </a:xfrm>
           <a:prstGeom prst="line">
@@ -4354,7 +4242,7 @@
         </p:nvCxnSpPr>
         <p:spPr>
           <a:xfrm>
-            <a:off x="8557315" y="4463213"/>
+            <a:off x="5428035" y="4707053"/>
             <a:ext cx="587513" cy="0"/>
           </a:xfrm>
           <a:prstGeom prst="line">
@@ -4399,8 +4287,8 @@
         </p:nvCxnSpPr>
         <p:spPr>
           <a:xfrm flipV="1">
-            <a:off x="8840788" y="2803319"/>
-            <a:ext cx="6141" cy="2146506"/>
+            <a:off x="5712675" y="3047159"/>
+            <a:ext cx="4974" cy="2281761"/>
           </a:xfrm>
           <a:prstGeom prst="line">
             <a:avLst/>
@@ -4442,7 +4330,7 @@
         </p:nvSpPr>
         <p:spPr>
           <a:xfrm>
-            <a:off x="8826623" y="4175870"/>
+            <a:off x="5697343" y="4419710"/>
             <a:ext cx="45719" cy="45719"/>
           </a:xfrm>
           <a:prstGeom prst="ellipse">
@@ -4502,7 +4390,7 @@
         </p:nvCxnSpPr>
         <p:spPr>
           <a:xfrm>
-            <a:off x="8846928" y="3876806"/>
+            <a:off x="5717648" y="4120646"/>
             <a:ext cx="266150" cy="0"/>
           </a:xfrm>
           <a:prstGeom prst="line">
@@ -4548,7 +4436,7 @@
         </p:nvCxnSpPr>
         <p:spPr>
           <a:xfrm>
-            <a:off x="8872342" y="4198730"/>
+            <a:off x="5743062" y="4442570"/>
             <a:ext cx="272486" cy="128"/>
           </a:xfrm>
           <a:prstGeom prst="line">
@@ -4593,7 +4481,7 @@
         </p:nvCxnSpPr>
         <p:spPr>
           <a:xfrm>
-            <a:off x="8841955" y="4513537"/>
+            <a:off x="5712675" y="4757377"/>
             <a:ext cx="302873" cy="0"/>
           </a:xfrm>
           <a:prstGeom prst="line">
@@ -4636,7 +4524,7 @@
         </p:nvSpPr>
         <p:spPr>
           <a:xfrm>
-            <a:off x="8823238" y="3853541"/>
+            <a:off x="5693958" y="4097381"/>
             <a:ext cx="45719" cy="45719"/>
           </a:xfrm>
           <a:prstGeom prst="ellipse">
@@ -4694,7 +4582,7 @@
         </p:nvSpPr>
         <p:spPr>
           <a:xfrm>
-            <a:off x="8826623" y="3399570"/>
+            <a:off x="5697343" y="3643410"/>
             <a:ext cx="45719" cy="45719"/>
           </a:xfrm>
           <a:prstGeom prst="ellipse">
@@ -4754,7 +4642,7 @@
         </p:nvCxnSpPr>
         <p:spPr>
           <a:xfrm>
-            <a:off x="6535528" y="2212667"/>
+            <a:off x="3406248" y="2456507"/>
             <a:ext cx="394439" cy="0"/>
           </a:xfrm>
           <a:prstGeom prst="line">
@@ -4799,7 +4687,7 @@
         </p:nvCxnSpPr>
         <p:spPr>
           <a:xfrm>
-            <a:off x="6920370" y="1500416"/>
+            <a:off x="3791090" y="1744256"/>
             <a:ext cx="992046" cy="0"/>
           </a:xfrm>
           <a:prstGeom prst="line">
@@ -4844,7 +4732,7 @@
         </p:nvCxnSpPr>
         <p:spPr>
           <a:xfrm flipV="1">
-            <a:off x="6923546" y="1495652"/>
+            <a:off x="3794266" y="1739492"/>
             <a:ext cx="0" cy="714928"/>
           </a:xfrm>
           <a:prstGeom prst="line">
@@ -4889,7 +4777,7 @@
         </p:nvCxnSpPr>
         <p:spPr>
           <a:xfrm>
-            <a:off x="6535528" y="2365096"/>
+            <a:off x="3406248" y="2608936"/>
             <a:ext cx="479106" cy="2087"/>
           </a:xfrm>
           <a:prstGeom prst="line">
@@ -4934,7 +4822,7 @@
         </p:nvCxnSpPr>
         <p:spPr>
           <a:xfrm>
-            <a:off x="7003979" y="1823726"/>
+            <a:off x="3874699" y="2067566"/>
             <a:ext cx="931404" cy="0"/>
           </a:xfrm>
           <a:prstGeom prst="line">
@@ -4979,7 +4867,7 @@
         </p:nvCxnSpPr>
         <p:spPr>
           <a:xfrm flipV="1">
-            <a:off x="7008213" y="1823726"/>
+            <a:off x="3878933" y="2067566"/>
             <a:ext cx="0" cy="541370"/>
           </a:xfrm>
           <a:prstGeom prst="line">
@@ -5024,7 +4912,7 @@
         </p:nvCxnSpPr>
         <p:spPr>
           <a:xfrm>
-            <a:off x="6535528" y="2519583"/>
+            <a:off x="3406248" y="2763423"/>
             <a:ext cx="578587" cy="0"/>
           </a:xfrm>
           <a:prstGeom prst="line">
@@ -5069,7 +4957,7 @@
         </p:nvCxnSpPr>
         <p:spPr>
           <a:xfrm>
-            <a:off x="7103460" y="2134567"/>
+            <a:off x="3974180" y="2378407"/>
             <a:ext cx="827689" cy="0"/>
           </a:xfrm>
           <a:prstGeom prst="line">
@@ -5114,7 +5002,7 @@
         </p:nvCxnSpPr>
         <p:spPr>
           <a:xfrm flipV="1">
-            <a:off x="7107694" y="2134567"/>
+            <a:off x="3978414" y="2378407"/>
             <a:ext cx="0" cy="382929"/>
           </a:xfrm>
           <a:prstGeom prst="line">
@@ -5159,7 +5047,7 @@
         </p:nvCxnSpPr>
         <p:spPr>
           <a:xfrm>
-            <a:off x="6535528" y="2665959"/>
+            <a:off x="3406248" y="2909799"/>
             <a:ext cx="574353" cy="0"/>
           </a:xfrm>
           <a:prstGeom prst="line">
@@ -5204,7 +5092,7 @@
         </p:nvCxnSpPr>
         <p:spPr>
           <a:xfrm>
-            <a:off x="7097234" y="3832688"/>
+            <a:off x="3967954" y="4076528"/>
             <a:ext cx="827689" cy="0"/>
           </a:xfrm>
           <a:prstGeom prst="line">
@@ -5249,7 +5137,7 @@
         </p:nvCxnSpPr>
         <p:spPr>
           <a:xfrm>
-            <a:off x="7103460" y="2668637"/>
+            <a:off x="3974180" y="2912477"/>
             <a:ext cx="0" cy="1164051"/>
           </a:xfrm>
           <a:prstGeom prst="line">
@@ -5294,7 +5182,7 @@
         </p:nvCxnSpPr>
         <p:spPr>
           <a:xfrm>
-            <a:off x="6535528" y="2814222"/>
+            <a:off x="3406248" y="3058062"/>
             <a:ext cx="467320" cy="0"/>
           </a:xfrm>
           <a:prstGeom prst="line">
@@ -5339,7 +5227,7 @@
         </p:nvCxnSpPr>
         <p:spPr>
           <a:xfrm>
-            <a:off x="7009269" y="4149973"/>
+            <a:off x="3879989" y="4393813"/>
             <a:ext cx="926114" cy="0"/>
           </a:xfrm>
           <a:prstGeom prst="line">
@@ -5384,7 +5272,7 @@
         </p:nvCxnSpPr>
         <p:spPr>
           <a:xfrm>
-            <a:off x="7002848" y="2812136"/>
+            <a:off x="3873568" y="3055976"/>
             <a:ext cx="0" cy="1337837"/>
           </a:xfrm>
           <a:prstGeom prst="line">
@@ -5429,7 +5317,7 @@
         </p:nvCxnSpPr>
         <p:spPr>
           <a:xfrm>
-            <a:off x="6543994" y="2965715"/>
+            <a:off x="3414714" y="3209555"/>
             <a:ext cx="377272" cy="0"/>
           </a:xfrm>
           <a:prstGeom prst="line">
@@ -5474,7 +5362,7 @@
         </p:nvCxnSpPr>
         <p:spPr>
           <a:xfrm>
-            <a:off x="6921266" y="4459377"/>
+            <a:off x="3791986" y="4703217"/>
             <a:ext cx="1022584" cy="3836"/>
           </a:xfrm>
           <a:prstGeom prst="line">
@@ -5519,7 +5407,7 @@
         </p:nvCxnSpPr>
         <p:spPr>
           <a:xfrm>
-            <a:off x="6914845" y="2963629"/>
+            <a:off x="3785565" y="3207469"/>
             <a:ext cx="0" cy="1495748"/>
           </a:xfrm>
           <a:prstGeom prst="line">
@@ -5570,7 +5458,7 @@
         </p:blipFill>
         <p:spPr>
           <a:xfrm rot="5400000" flipH="1">
-            <a:off x="9229145" y="4780729"/>
+            <a:off x="6099865" y="5024569"/>
             <a:ext cx="457774" cy="491213"/>
           </a:xfrm>
           <a:prstGeom prst="rect">
@@ -5600,7 +5488,7 @@
         </p:blipFill>
         <p:spPr>
           <a:xfrm>
-            <a:off x="7812957" y="4762719"/>
+            <a:off x="4683676" y="4971135"/>
             <a:ext cx="957086" cy="429867"/>
           </a:xfrm>
           <a:prstGeom prst="rect">
@@ -5622,7 +5510,7 @@
         </p:nvSpPr>
         <p:spPr>
           <a:xfrm>
-            <a:off x="8819321" y="4490234"/>
+            <a:off x="5690041" y="4734074"/>
             <a:ext cx="45719" cy="45719"/>
           </a:xfrm>
           <a:prstGeom prst="ellipse">
@@ -5682,7 +5570,7 @@
         </p:nvCxnSpPr>
         <p:spPr>
           <a:xfrm>
-            <a:off x="8842103" y="4949279"/>
+            <a:off x="5716191" y="5250597"/>
             <a:ext cx="412228" cy="0"/>
           </a:xfrm>
           <a:prstGeom prst="line">
@@ -5727,7 +5615,7 @@
         </p:nvCxnSpPr>
         <p:spPr>
           <a:xfrm>
-            <a:off x="8632600" y="4998900"/>
+            <a:off x="5503320" y="5217340"/>
             <a:ext cx="621731" cy="0"/>
           </a:xfrm>
           <a:prstGeom prst="line">
@@ -5772,7 +5660,7 @@
         </p:nvCxnSpPr>
         <p:spPr>
           <a:xfrm>
-            <a:off x="6535528" y="3117748"/>
+            <a:off x="3406248" y="3361588"/>
             <a:ext cx="291096" cy="0"/>
           </a:xfrm>
           <a:prstGeom prst="line">
@@ -5817,7 +5705,7 @@
         </p:nvCxnSpPr>
         <p:spPr>
           <a:xfrm>
-            <a:off x="6825842" y="4997763"/>
+            <a:off x="3690923" y="5206731"/>
             <a:ext cx="1022584" cy="3836"/>
           </a:xfrm>
           <a:prstGeom prst="line">
@@ -5862,8 +5750,8 @@
         </p:nvCxnSpPr>
         <p:spPr>
           <a:xfrm>
-            <a:off x="6820203" y="3115662"/>
-            <a:ext cx="0" cy="1882101"/>
+            <a:off x="3690923" y="3359502"/>
+            <a:ext cx="0" cy="1847229"/>
           </a:xfrm>
           <a:prstGeom prst="line">
             <a:avLst/>
@@ -5893,10 +5781,10 @@
       </p:cxnSp>
       <p:cxnSp>
         <p:nvCxnSpPr>
-          <p:cNvPr id="139" name="Gerader Verbinder 138">
-            <a:extLst>
-              <a:ext uri="{FF2B5EF4-FFF2-40B4-BE49-F238E27FC236}">
-                <a16:creationId xmlns:a16="http://schemas.microsoft.com/office/drawing/2014/main" id="{A7437F44-D2BC-4C99-BA56-6AE20B74711B}"/>
+          <p:cNvPr id="152" name="Gerader Verbinder 151">
+            <a:extLst>
+              <a:ext uri="{FF2B5EF4-FFF2-40B4-BE49-F238E27FC236}">
+                <a16:creationId xmlns:a16="http://schemas.microsoft.com/office/drawing/2014/main" id="{BE04A1EE-76B8-46D4-AC49-4DF8D34B2A54}"/>
               </a:ext>
             </a:extLst>
           </p:cNvPr>
@@ -5907,8 +5795,8 @@
         </p:nvCxnSpPr>
         <p:spPr>
           <a:xfrm>
-            <a:off x="6537644" y="3264928"/>
-            <a:ext cx="1406206" cy="2227"/>
+            <a:off x="3600872" y="5396799"/>
+            <a:ext cx="2571708" cy="0"/>
           </a:xfrm>
           <a:prstGeom prst="line">
             <a:avLst/>
@@ -5936,12 +5824,57 @@
           </a:fontRef>
         </p:style>
       </p:cxnSp>
-      <p:sp>
-        <p:nvSpPr>
-          <p:cNvPr id="143" name="Ellipse 142">
-            <a:extLst>
-              <a:ext uri="{FF2B5EF4-FFF2-40B4-BE49-F238E27FC236}">
-                <a16:creationId xmlns:a16="http://schemas.microsoft.com/office/drawing/2014/main" id="{1BBA8706-C07C-45D0-8B2D-66C394BE6AE8}"/>
+      <p:cxnSp>
+        <p:nvCxnSpPr>
+          <p:cNvPr id="153" name="Gerader Verbinder 152">
+            <a:extLst>
+              <a:ext uri="{FF2B5EF4-FFF2-40B4-BE49-F238E27FC236}">
+                <a16:creationId xmlns:a16="http://schemas.microsoft.com/office/drawing/2014/main" id="{450291D8-0B73-4A45-8B0C-E3BD065AB7F1}"/>
+              </a:ext>
+            </a:extLst>
+          </p:cNvPr>
+          <p:cNvCxnSpPr>
+            <a:cxnSpLocks/>
+          </p:cNvCxnSpPr>
+          <p:nvPr/>
+        </p:nvCxnSpPr>
+        <p:spPr>
+          <a:xfrm>
+            <a:off x="3593781" y="3508767"/>
+            <a:ext cx="0" cy="1892235"/>
+          </a:xfrm>
+          <a:prstGeom prst="line">
+            <a:avLst/>
+          </a:prstGeom>
+          <a:ln w="19050">
+            <a:solidFill>
+              <a:schemeClr val="bg2">
+                <a:lumMod val="50000"/>
+              </a:schemeClr>
+            </a:solidFill>
+          </a:ln>
+        </p:spPr>
+        <p:style>
+          <a:lnRef idx="1">
+            <a:schemeClr val="accent1"/>
+          </a:lnRef>
+          <a:fillRef idx="0">
+            <a:schemeClr val="accent1"/>
+          </a:fillRef>
+          <a:effectRef idx="0">
+            <a:schemeClr val="accent1"/>
+          </a:effectRef>
+          <a:fontRef idx="minor">
+            <a:schemeClr val="tx1"/>
+          </a:fontRef>
+        </p:style>
+      </p:cxnSp>
+      <p:sp>
+        <p:nvSpPr>
+          <p:cNvPr id="133" name="Rechteck 132">
+            <a:extLst>
+              <a:ext uri="{FF2B5EF4-FFF2-40B4-BE49-F238E27FC236}">
+                <a16:creationId xmlns:a16="http://schemas.microsoft.com/office/drawing/2014/main" id="{6049FE96-DED3-4701-8D0C-7DEB2B2A09EF}"/>
               </a:ext>
             </a:extLst>
           </p:cNvPr>
@@ -5950,7 +5883,1094 @@
         </p:nvSpPr>
         <p:spPr>
           <a:xfrm>
-            <a:off x="6696500" y="3244741"/>
+            <a:off x="6015548" y="1548765"/>
+            <a:ext cx="492910" cy="1124215"/>
+          </a:xfrm>
+          <a:prstGeom prst="rect">
+            <a:avLst/>
+          </a:prstGeom>
+          <a:solidFill>
+            <a:schemeClr val="bg2">
+              <a:lumMod val="75000"/>
+              <a:alpha val="47000"/>
+            </a:schemeClr>
+          </a:solidFill>
+          <a:ln>
+            <a:noFill/>
+          </a:ln>
+        </p:spPr>
+        <p:style>
+          <a:lnRef idx="2">
+            <a:schemeClr val="accent1">
+              <a:shade val="50000"/>
+            </a:schemeClr>
+          </a:lnRef>
+          <a:fillRef idx="1">
+            <a:schemeClr val="accent1"/>
+          </a:fillRef>
+          <a:effectRef idx="0">
+            <a:schemeClr val="accent1"/>
+          </a:effectRef>
+          <a:fontRef idx="minor">
+            <a:schemeClr val="lt1"/>
+          </a:fontRef>
+        </p:style>
+        <p:txBody>
+          <a:bodyPr rtlCol="0" anchor="ctr"/>
+          <a:lstStyle/>
+          <a:p>
+            <a:pPr algn="ctr"/>
+            <a:endParaRPr lang="de-CH"/>
+          </a:p>
+        </p:txBody>
+      </p:sp>
+      <p:sp>
+        <p:nvSpPr>
+          <p:cNvPr id="177" name="Rechteck 176">
+            <a:extLst>
+              <a:ext uri="{FF2B5EF4-FFF2-40B4-BE49-F238E27FC236}">
+                <a16:creationId xmlns:a16="http://schemas.microsoft.com/office/drawing/2014/main" id="{C6D90BF7-0C4D-4661-8658-6C188A048C91}"/>
+              </a:ext>
+            </a:extLst>
+          </p:cNvPr>
+          <p:cNvSpPr/>
+          <p:nvPr/>
+        </p:nvSpPr>
+        <p:spPr>
+          <a:xfrm>
+            <a:off x="6013225" y="3922149"/>
+            <a:ext cx="492910" cy="1039253"/>
+          </a:xfrm>
+          <a:prstGeom prst="rect">
+            <a:avLst/>
+          </a:prstGeom>
+          <a:solidFill>
+            <a:schemeClr val="bg2">
+              <a:lumMod val="75000"/>
+              <a:alpha val="47000"/>
+            </a:schemeClr>
+          </a:solidFill>
+          <a:ln>
+            <a:noFill/>
+          </a:ln>
+        </p:spPr>
+        <p:style>
+          <a:lnRef idx="2">
+            <a:schemeClr val="accent1">
+              <a:shade val="50000"/>
+            </a:schemeClr>
+          </a:lnRef>
+          <a:fillRef idx="1">
+            <a:schemeClr val="accent1"/>
+          </a:fillRef>
+          <a:effectRef idx="0">
+            <a:schemeClr val="accent1"/>
+          </a:effectRef>
+          <a:fontRef idx="minor">
+            <a:schemeClr val="lt1"/>
+          </a:fontRef>
+        </p:style>
+        <p:txBody>
+          <a:bodyPr rtlCol="0" anchor="ctr"/>
+          <a:lstStyle/>
+          <a:p>
+            <a:pPr algn="ctr"/>
+            <a:endParaRPr lang="de-CH"/>
+          </a:p>
+        </p:txBody>
+      </p:sp>
+      <p:sp>
+        <p:nvSpPr>
+          <p:cNvPr id="184" name="Rechteck 183">
+            <a:extLst>
+              <a:ext uri="{FF2B5EF4-FFF2-40B4-BE49-F238E27FC236}">
+                <a16:creationId xmlns:a16="http://schemas.microsoft.com/office/drawing/2014/main" id="{FF2DB5F5-780D-4F95-90B4-79251A9A2BEA}"/>
+              </a:ext>
+            </a:extLst>
+          </p:cNvPr>
+          <p:cNvSpPr/>
+          <p:nvPr/>
+        </p:nvSpPr>
+        <p:spPr>
+          <a:xfrm>
+            <a:off x="6212850" y="2672980"/>
+            <a:ext cx="118961" cy="835787"/>
+          </a:xfrm>
+          <a:prstGeom prst="rect">
+            <a:avLst/>
+          </a:prstGeom>
+          <a:solidFill>
+            <a:schemeClr val="bg2">
+              <a:lumMod val="75000"/>
+              <a:alpha val="47000"/>
+            </a:schemeClr>
+          </a:solidFill>
+          <a:ln>
+            <a:noFill/>
+          </a:ln>
+        </p:spPr>
+        <p:style>
+          <a:lnRef idx="2">
+            <a:schemeClr val="accent1">
+              <a:shade val="50000"/>
+            </a:schemeClr>
+          </a:lnRef>
+          <a:fillRef idx="1">
+            <a:schemeClr val="accent1"/>
+          </a:fillRef>
+          <a:effectRef idx="0">
+            <a:schemeClr val="accent1"/>
+          </a:effectRef>
+          <a:fontRef idx="minor">
+            <a:schemeClr val="lt1"/>
+          </a:fontRef>
+        </p:style>
+        <p:txBody>
+          <a:bodyPr rtlCol="0" anchor="ctr"/>
+          <a:lstStyle/>
+          <a:p>
+            <a:pPr algn="ctr"/>
+            <a:endParaRPr lang="de-CH"/>
+          </a:p>
+        </p:txBody>
+      </p:sp>
+      <p:sp>
+        <p:nvSpPr>
+          <p:cNvPr id="185" name="Rechteck 184">
+            <a:extLst>
+              <a:ext uri="{FF2B5EF4-FFF2-40B4-BE49-F238E27FC236}">
+                <a16:creationId xmlns:a16="http://schemas.microsoft.com/office/drawing/2014/main" id="{B5902E9C-61FA-4B4F-A758-6624C655F170}"/>
+              </a:ext>
+            </a:extLst>
+          </p:cNvPr>
+          <p:cNvSpPr/>
+          <p:nvPr/>
+        </p:nvSpPr>
+        <p:spPr>
+          <a:xfrm>
+            <a:off x="6212851" y="4961402"/>
+            <a:ext cx="125102" cy="1039247"/>
+          </a:xfrm>
+          <a:prstGeom prst="rect">
+            <a:avLst/>
+          </a:prstGeom>
+          <a:solidFill>
+            <a:schemeClr val="bg2">
+              <a:lumMod val="75000"/>
+              <a:alpha val="47000"/>
+            </a:schemeClr>
+          </a:solidFill>
+          <a:ln>
+            <a:noFill/>
+          </a:ln>
+        </p:spPr>
+        <p:style>
+          <a:lnRef idx="2">
+            <a:schemeClr val="accent1">
+              <a:shade val="50000"/>
+            </a:schemeClr>
+          </a:lnRef>
+          <a:fillRef idx="1">
+            <a:schemeClr val="accent1"/>
+          </a:fillRef>
+          <a:effectRef idx="0">
+            <a:schemeClr val="accent1"/>
+          </a:effectRef>
+          <a:fontRef idx="minor">
+            <a:schemeClr val="lt1"/>
+          </a:fontRef>
+        </p:style>
+        <p:txBody>
+          <a:bodyPr rtlCol="0" anchor="ctr"/>
+          <a:lstStyle/>
+          <a:p>
+            <a:pPr algn="ctr"/>
+            <a:endParaRPr lang="de-CH"/>
+          </a:p>
+        </p:txBody>
+      </p:sp>
+      <p:pic>
+        <p:nvPicPr>
+          <p:cNvPr id="144" name="Picture 6" descr="9V Block Batterie &amp; Akku Test | akkuline.de">
+            <a:extLst>
+              <a:ext uri="{FF2B5EF4-FFF2-40B4-BE49-F238E27FC236}">
+                <a16:creationId xmlns:a16="http://schemas.microsoft.com/office/drawing/2014/main" id="{810714A8-B88A-4A47-A596-471977890C16}"/>
+              </a:ext>
+            </a:extLst>
+          </p:cNvPr>
+          <p:cNvPicPr>
+            <a:picLocks noChangeAspect="1" noChangeArrowheads="1"/>
+          </p:cNvPicPr>
+          <p:nvPr/>
+        </p:nvPicPr>
+        <p:blipFill>
+          <a:blip r:embed="rId6">
+            <a:extLst>
+              <a:ext uri="{28A0092B-C50C-407E-A947-70E740481C1C}">
+                <a14:useLocalDpi xmlns:a14="http://schemas.microsoft.com/office/drawing/2010/main" val="0"/>
+              </a:ext>
+            </a:extLst>
+          </a:blip>
+          <a:srcRect/>
+          <a:stretch>
+            <a:fillRect/>
+          </a:stretch>
+        </p:blipFill>
+        <p:spPr bwMode="auto">
+          <a:xfrm>
+            <a:off x="229385" y="4322309"/>
+            <a:ext cx="1499434" cy="1499434"/>
+          </a:xfrm>
+          <a:prstGeom prst="rect">
+            <a:avLst/>
+          </a:prstGeom>
+          <a:noFill/>
+          <a:extLst>
+            <a:ext uri="{909E8E84-426E-40DD-AFC4-6F175D3DCCD1}">
+              <a14:hiddenFill xmlns:a14="http://schemas.microsoft.com/office/drawing/2010/main">
+                <a:solidFill>
+                  <a:srgbClr val="FFFFFF"/>
+                </a:solidFill>
+              </a14:hiddenFill>
+            </a:ext>
+          </a:extLst>
+        </p:spPr>
+      </p:pic>
+      <p:cxnSp>
+        <p:nvCxnSpPr>
+          <p:cNvPr id="188" name="Gerader Verbinder 187">
+            <a:extLst>
+              <a:ext uri="{FF2B5EF4-FFF2-40B4-BE49-F238E27FC236}">
+                <a16:creationId xmlns:a16="http://schemas.microsoft.com/office/drawing/2014/main" id="{733AEF3B-20A4-48F4-A59A-83341AD6CC1C}"/>
+              </a:ext>
+            </a:extLst>
+          </p:cNvPr>
+          <p:cNvCxnSpPr>
+            <a:cxnSpLocks/>
+          </p:cNvCxnSpPr>
+          <p:nvPr/>
+        </p:nvCxnSpPr>
+        <p:spPr>
+          <a:xfrm flipV="1">
+            <a:off x="821115" y="3955343"/>
+            <a:ext cx="0" cy="389737"/>
+          </a:xfrm>
+          <a:prstGeom prst="line">
+            <a:avLst/>
+          </a:prstGeom>
+          <a:ln w="19050">
+            <a:solidFill>
+              <a:schemeClr val="bg2">
+                <a:lumMod val="50000"/>
+              </a:schemeClr>
+            </a:solidFill>
+          </a:ln>
+        </p:spPr>
+        <p:style>
+          <a:lnRef idx="1">
+            <a:schemeClr val="accent1"/>
+          </a:lnRef>
+          <a:fillRef idx="0">
+            <a:schemeClr val="accent1"/>
+          </a:fillRef>
+          <a:effectRef idx="0">
+            <a:schemeClr val="accent1"/>
+          </a:effectRef>
+          <a:fontRef idx="minor">
+            <a:schemeClr val="tx1"/>
+          </a:fontRef>
+        </p:style>
+      </p:cxnSp>
+      <p:cxnSp>
+        <p:nvCxnSpPr>
+          <p:cNvPr id="189" name="Gerader Verbinder 188">
+            <a:extLst>
+              <a:ext uri="{FF2B5EF4-FFF2-40B4-BE49-F238E27FC236}">
+                <a16:creationId xmlns:a16="http://schemas.microsoft.com/office/drawing/2014/main" id="{3C8DCF77-037D-4198-8B85-333682BF7B93}"/>
+              </a:ext>
+            </a:extLst>
+          </p:cNvPr>
+          <p:cNvCxnSpPr>
+            <a:cxnSpLocks/>
+          </p:cNvCxnSpPr>
+          <p:nvPr/>
+        </p:nvCxnSpPr>
+        <p:spPr>
+          <a:xfrm>
+            <a:off x="815019" y="3955343"/>
+            <a:ext cx="1685604" cy="0"/>
+          </a:xfrm>
+          <a:prstGeom prst="line">
+            <a:avLst/>
+          </a:prstGeom>
+          <a:ln w="19050">
+            <a:solidFill>
+              <a:schemeClr val="bg2">
+                <a:lumMod val="50000"/>
+              </a:schemeClr>
+            </a:solidFill>
+          </a:ln>
+        </p:spPr>
+        <p:style>
+          <a:lnRef idx="1">
+            <a:schemeClr val="accent1"/>
+          </a:lnRef>
+          <a:fillRef idx="0">
+            <a:schemeClr val="accent1"/>
+          </a:fillRef>
+          <a:effectRef idx="0">
+            <a:schemeClr val="accent1"/>
+          </a:effectRef>
+          <a:fontRef idx="minor">
+            <a:schemeClr val="tx1"/>
+          </a:fontRef>
+        </p:style>
+      </p:cxnSp>
+      <p:cxnSp>
+        <p:nvCxnSpPr>
+          <p:cNvPr id="196" name="Gerader Verbinder 195">
+            <a:extLst>
+              <a:ext uri="{FF2B5EF4-FFF2-40B4-BE49-F238E27FC236}">
+                <a16:creationId xmlns:a16="http://schemas.microsoft.com/office/drawing/2014/main" id="{3CDBBF8D-4C83-42B6-B81A-A498B29638EE}"/>
+              </a:ext>
+            </a:extLst>
+          </p:cNvPr>
+          <p:cNvCxnSpPr>
+            <a:cxnSpLocks/>
+          </p:cNvCxnSpPr>
+          <p:nvPr/>
+        </p:nvCxnSpPr>
+        <p:spPr>
+          <a:xfrm>
+            <a:off x="1168823" y="4109554"/>
+            <a:ext cx="1337896" cy="0"/>
+          </a:xfrm>
+          <a:prstGeom prst="line">
+            <a:avLst/>
+          </a:prstGeom>
+          <a:ln w="19050">
+            <a:solidFill>
+              <a:schemeClr val="bg2">
+                <a:lumMod val="50000"/>
+              </a:schemeClr>
+            </a:solidFill>
+          </a:ln>
+        </p:spPr>
+        <p:style>
+          <a:lnRef idx="1">
+            <a:schemeClr val="accent1"/>
+          </a:lnRef>
+          <a:fillRef idx="0">
+            <a:schemeClr val="accent1"/>
+          </a:fillRef>
+          <a:effectRef idx="0">
+            <a:schemeClr val="accent1"/>
+          </a:effectRef>
+          <a:fontRef idx="minor">
+            <a:schemeClr val="tx1"/>
+          </a:fontRef>
+        </p:style>
+      </p:cxnSp>
+      <p:cxnSp>
+        <p:nvCxnSpPr>
+          <p:cNvPr id="198" name="Gerader Verbinder 197">
+            <a:extLst>
+              <a:ext uri="{FF2B5EF4-FFF2-40B4-BE49-F238E27FC236}">
+                <a16:creationId xmlns:a16="http://schemas.microsoft.com/office/drawing/2014/main" id="{3E492A85-DA86-44A1-A7FD-362D8C46FAFE}"/>
+              </a:ext>
+            </a:extLst>
+          </p:cNvPr>
+          <p:cNvCxnSpPr>
+            <a:cxnSpLocks/>
+          </p:cNvCxnSpPr>
+          <p:nvPr/>
+        </p:nvCxnSpPr>
+        <p:spPr>
+          <a:xfrm flipV="1">
+            <a:off x="1168823" y="4109554"/>
+            <a:ext cx="0" cy="235526"/>
+          </a:xfrm>
+          <a:prstGeom prst="line">
+            <a:avLst/>
+          </a:prstGeom>
+          <a:ln w="19050">
+            <a:solidFill>
+              <a:schemeClr val="bg2">
+                <a:lumMod val="50000"/>
+              </a:schemeClr>
+            </a:solidFill>
+          </a:ln>
+        </p:spPr>
+        <p:style>
+          <a:lnRef idx="1">
+            <a:schemeClr val="accent1"/>
+          </a:lnRef>
+          <a:fillRef idx="0">
+            <a:schemeClr val="accent1"/>
+          </a:fillRef>
+          <a:effectRef idx="0">
+            <a:schemeClr val="accent1"/>
+          </a:effectRef>
+          <a:fontRef idx="minor">
+            <a:schemeClr val="tx1"/>
+          </a:fontRef>
+        </p:style>
+      </p:cxnSp>
+      <p:sp>
+        <p:nvSpPr>
+          <p:cNvPr id="201" name="Textfeld 200">
+            <a:extLst>
+              <a:ext uri="{FF2B5EF4-FFF2-40B4-BE49-F238E27FC236}">
+                <a16:creationId xmlns:a16="http://schemas.microsoft.com/office/drawing/2014/main" id="{6AD28ACE-CA4D-4C7C-A75A-E262A20E2A40}"/>
+              </a:ext>
+            </a:extLst>
+          </p:cNvPr>
+          <p:cNvSpPr txBox="1"/>
+          <p:nvPr/>
+        </p:nvSpPr>
+        <p:spPr>
+          <a:xfrm>
+            <a:off x="4868654" y="1717935"/>
+            <a:ext cx="604619" cy="215444"/>
+          </a:xfrm>
+          <a:prstGeom prst="rect">
+            <a:avLst/>
+          </a:prstGeom>
+          <a:noFill/>
+        </p:spPr>
+        <p:txBody>
+          <a:bodyPr wrap="square" rtlCol="0">
+            <a:spAutoFit/>
+          </a:bodyPr>
+          <a:lstStyle/>
+          <a:p>
+            <a:r>
+              <a:rPr lang="de-CH" sz="800" dirty="0"/>
+              <a:t>130 Ohm</a:t>
+            </a:r>
+          </a:p>
+        </p:txBody>
+      </p:sp>
+      <p:sp>
+        <p:nvSpPr>
+          <p:cNvPr id="202" name="Textfeld 201">
+            <a:extLst>
+              <a:ext uri="{FF2B5EF4-FFF2-40B4-BE49-F238E27FC236}">
+                <a16:creationId xmlns:a16="http://schemas.microsoft.com/office/drawing/2014/main" id="{CB147F44-7878-4460-8DCA-83E2EE7BE4BC}"/>
+              </a:ext>
+            </a:extLst>
+          </p:cNvPr>
+          <p:cNvSpPr txBox="1"/>
+          <p:nvPr/>
+        </p:nvSpPr>
+        <p:spPr>
+          <a:xfrm>
+            <a:off x="4868654" y="2057522"/>
+            <a:ext cx="604619" cy="215444"/>
+          </a:xfrm>
+          <a:prstGeom prst="rect">
+            <a:avLst/>
+          </a:prstGeom>
+          <a:noFill/>
+        </p:spPr>
+        <p:txBody>
+          <a:bodyPr wrap="square" rtlCol="0">
+            <a:spAutoFit/>
+          </a:bodyPr>
+          <a:lstStyle/>
+          <a:p>
+            <a:r>
+              <a:rPr lang="de-CH" sz="800" dirty="0"/>
+              <a:t>130 Ohm</a:t>
+            </a:r>
+          </a:p>
+        </p:txBody>
+      </p:sp>
+      <p:sp>
+        <p:nvSpPr>
+          <p:cNvPr id="203" name="Textfeld 202">
+            <a:extLst>
+              <a:ext uri="{FF2B5EF4-FFF2-40B4-BE49-F238E27FC236}">
+                <a16:creationId xmlns:a16="http://schemas.microsoft.com/office/drawing/2014/main" id="{B3D59F56-ADC2-4826-8D27-03B253B7C39D}"/>
+              </a:ext>
+            </a:extLst>
+          </p:cNvPr>
+          <p:cNvSpPr txBox="1"/>
+          <p:nvPr/>
+        </p:nvSpPr>
+        <p:spPr>
+          <a:xfrm>
+            <a:off x="4868654" y="2379041"/>
+            <a:ext cx="604619" cy="215444"/>
+          </a:xfrm>
+          <a:prstGeom prst="rect">
+            <a:avLst/>
+          </a:prstGeom>
+          <a:noFill/>
+        </p:spPr>
+        <p:txBody>
+          <a:bodyPr wrap="square" rtlCol="0">
+            <a:spAutoFit/>
+          </a:bodyPr>
+          <a:lstStyle/>
+          <a:p>
+            <a:r>
+              <a:rPr lang="de-CH" sz="800" dirty="0"/>
+              <a:t>130 Ohm</a:t>
+            </a:r>
+          </a:p>
+        </p:txBody>
+      </p:sp>
+      <p:sp>
+        <p:nvSpPr>
+          <p:cNvPr id="204" name="Textfeld 203">
+            <a:extLst>
+              <a:ext uri="{FF2B5EF4-FFF2-40B4-BE49-F238E27FC236}">
+                <a16:creationId xmlns:a16="http://schemas.microsoft.com/office/drawing/2014/main" id="{22495EBA-00AF-461A-AAA3-F3474F2F2FDF}"/>
+              </a:ext>
+            </a:extLst>
+          </p:cNvPr>
+          <p:cNvSpPr txBox="1"/>
+          <p:nvPr/>
+        </p:nvSpPr>
+        <p:spPr>
+          <a:xfrm>
+            <a:off x="4896886" y="4050239"/>
+            <a:ext cx="604619" cy="215444"/>
+          </a:xfrm>
+          <a:prstGeom prst="rect">
+            <a:avLst/>
+          </a:prstGeom>
+          <a:noFill/>
+        </p:spPr>
+        <p:txBody>
+          <a:bodyPr wrap="square" rtlCol="0">
+            <a:spAutoFit/>
+          </a:bodyPr>
+          <a:lstStyle/>
+          <a:p>
+            <a:r>
+              <a:rPr lang="de-CH" sz="800" dirty="0"/>
+              <a:t>130 Ohm</a:t>
+            </a:r>
+          </a:p>
+        </p:txBody>
+      </p:sp>
+      <p:sp>
+        <p:nvSpPr>
+          <p:cNvPr id="205" name="Textfeld 204">
+            <a:extLst>
+              <a:ext uri="{FF2B5EF4-FFF2-40B4-BE49-F238E27FC236}">
+                <a16:creationId xmlns:a16="http://schemas.microsoft.com/office/drawing/2014/main" id="{1AA7507D-25F9-4497-997A-983AB88D3017}"/>
+              </a:ext>
+            </a:extLst>
+          </p:cNvPr>
+          <p:cNvSpPr txBox="1"/>
+          <p:nvPr/>
+        </p:nvSpPr>
+        <p:spPr>
+          <a:xfrm>
+            <a:off x="4896886" y="4389826"/>
+            <a:ext cx="604619" cy="215444"/>
+          </a:xfrm>
+          <a:prstGeom prst="rect">
+            <a:avLst/>
+          </a:prstGeom>
+          <a:noFill/>
+        </p:spPr>
+        <p:txBody>
+          <a:bodyPr wrap="square" rtlCol="0">
+            <a:spAutoFit/>
+          </a:bodyPr>
+          <a:lstStyle/>
+          <a:p>
+            <a:r>
+              <a:rPr lang="de-CH" sz="800" dirty="0"/>
+              <a:t>130 Ohm</a:t>
+            </a:r>
+          </a:p>
+        </p:txBody>
+      </p:sp>
+      <p:sp>
+        <p:nvSpPr>
+          <p:cNvPr id="206" name="Textfeld 205">
+            <a:extLst>
+              <a:ext uri="{FF2B5EF4-FFF2-40B4-BE49-F238E27FC236}">
+                <a16:creationId xmlns:a16="http://schemas.microsoft.com/office/drawing/2014/main" id="{3F9CCF01-F39A-4A94-BF53-686B01896B89}"/>
+              </a:ext>
+            </a:extLst>
+          </p:cNvPr>
+          <p:cNvSpPr txBox="1"/>
+          <p:nvPr/>
+        </p:nvSpPr>
+        <p:spPr>
+          <a:xfrm>
+            <a:off x="4896886" y="4711345"/>
+            <a:ext cx="604619" cy="215444"/>
+          </a:xfrm>
+          <a:prstGeom prst="rect">
+            <a:avLst/>
+          </a:prstGeom>
+          <a:noFill/>
+        </p:spPr>
+        <p:txBody>
+          <a:bodyPr wrap="square" rtlCol="0">
+            <a:spAutoFit/>
+          </a:bodyPr>
+          <a:lstStyle/>
+          <a:p>
+            <a:r>
+              <a:rPr lang="de-CH" sz="800" dirty="0"/>
+              <a:t>130 Ohm</a:t>
+            </a:r>
+          </a:p>
+        </p:txBody>
+      </p:sp>
+      <p:sp>
+        <p:nvSpPr>
+          <p:cNvPr id="208" name="Textfeld 207">
+            <a:extLst>
+              <a:ext uri="{FF2B5EF4-FFF2-40B4-BE49-F238E27FC236}">
+                <a16:creationId xmlns:a16="http://schemas.microsoft.com/office/drawing/2014/main" id="{08509AE2-C157-45D5-A76D-C3AFE527373B}"/>
+              </a:ext>
+            </a:extLst>
+          </p:cNvPr>
+          <p:cNvSpPr txBox="1"/>
+          <p:nvPr/>
+        </p:nvSpPr>
+        <p:spPr>
+          <a:xfrm>
+            <a:off x="4896886" y="5186068"/>
+            <a:ext cx="604619" cy="215444"/>
+          </a:xfrm>
+          <a:prstGeom prst="rect">
+            <a:avLst/>
+          </a:prstGeom>
+          <a:noFill/>
+        </p:spPr>
+        <p:txBody>
+          <a:bodyPr wrap="square" rtlCol="0">
+            <a:spAutoFit/>
+          </a:bodyPr>
+          <a:lstStyle/>
+          <a:p>
+            <a:r>
+              <a:rPr lang="de-CH" sz="800" dirty="0"/>
+              <a:t>130 Ohm</a:t>
+            </a:r>
+          </a:p>
+        </p:txBody>
+      </p:sp>
+      <p:sp>
+        <p:nvSpPr>
+          <p:cNvPr id="209" name="Textfeld 208">
+            <a:extLst>
+              <a:ext uri="{FF2B5EF4-FFF2-40B4-BE49-F238E27FC236}">
+                <a16:creationId xmlns:a16="http://schemas.microsoft.com/office/drawing/2014/main" id="{2140523B-54F6-4710-922A-6B14489A9C8F}"/>
+              </a:ext>
+            </a:extLst>
+          </p:cNvPr>
+          <p:cNvSpPr txBox="1"/>
+          <p:nvPr/>
+        </p:nvSpPr>
+        <p:spPr>
+          <a:xfrm>
+            <a:off x="6628263" y="1921755"/>
+            <a:ext cx="819969" cy="400110"/>
+          </a:xfrm>
+          <a:prstGeom prst="rect">
+            <a:avLst/>
+          </a:prstGeom>
+          <a:noFill/>
+        </p:spPr>
+        <p:txBody>
+          <a:bodyPr wrap="square" rtlCol="0">
+            <a:spAutoFit/>
+          </a:bodyPr>
+          <a:lstStyle/>
+          <a:p>
+            <a:pPr algn="ctr"/>
+            <a:r>
+              <a:rPr lang="de-CH" sz="1000" b="1" dirty="0"/>
+              <a:t>Ampel</a:t>
+            </a:r>
+            <a:br>
+              <a:rPr lang="de-CH" sz="1000" b="1" dirty="0"/>
+            </a:br>
+            <a:r>
+              <a:rPr lang="de-CH" sz="1000" b="1" dirty="0"/>
+              <a:t>für Autos</a:t>
+            </a:r>
+          </a:p>
+        </p:txBody>
+      </p:sp>
+      <p:sp>
+        <p:nvSpPr>
+          <p:cNvPr id="210" name="Textfeld 209">
+            <a:extLst>
+              <a:ext uri="{FF2B5EF4-FFF2-40B4-BE49-F238E27FC236}">
+                <a16:creationId xmlns:a16="http://schemas.microsoft.com/office/drawing/2014/main" id="{2DC40D92-80FF-4697-91B5-197946C1BBB6}"/>
+              </a:ext>
+            </a:extLst>
+          </p:cNvPr>
+          <p:cNvSpPr txBox="1"/>
+          <p:nvPr/>
+        </p:nvSpPr>
+        <p:spPr>
+          <a:xfrm>
+            <a:off x="6612152" y="4209548"/>
+            <a:ext cx="954364" cy="400110"/>
+          </a:xfrm>
+          <a:prstGeom prst="rect">
+            <a:avLst/>
+          </a:prstGeom>
+          <a:noFill/>
+        </p:spPr>
+        <p:txBody>
+          <a:bodyPr wrap="square" rtlCol="0">
+            <a:spAutoFit/>
+          </a:bodyPr>
+          <a:lstStyle/>
+          <a:p>
+            <a:pPr algn="ctr"/>
+            <a:r>
+              <a:rPr lang="de-CH" sz="1000" b="1" dirty="0"/>
+              <a:t>Ampel für Fussgänger</a:t>
+            </a:r>
+          </a:p>
+        </p:txBody>
+      </p:sp>
+      <p:sp>
+        <p:nvSpPr>
+          <p:cNvPr id="211" name="Textfeld 210">
+            <a:extLst>
+              <a:ext uri="{FF2B5EF4-FFF2-40B4-BE49-F238E27FC236}">
+                <a16:creationId xmlns:a16="http://schemas.microsoft.com/office/drawing/2014/main" id="{74589D10-FDE2-4DFA-AF13-11D3F551D0A2}"/>
+              </a:ext>
+            </a:extLst>
+          </p:cNvPr>
+          <p:cNvSpPr txBox="1"/>
+          <p:nvPr/>
+        </p:nvSpPr>
+        <p:spPr>
+          <a:xfrm>
+            <a:off x="6592379" y="5097872"/>
+            <a:ext cx="954364" cy="338554"/>
+          </a:xfrm>
+          <a:prstGeom prst="rect">
+            <a:avLst/>
+          </a:prstGeom>
+          <a:noFill/>
+        </p:spPr>
+        <p:txBody>
+          <a:bodyPr wrap="square" rtlCol="0">
+            <a:spAutoFit/>
+          </a:bodyPr>
+          <a:lstStyle/>
+          <a:p>
+            <a:pPr algn="ctr"/>
+            <a:r>
+              <a:rPr lang="de-CH" sz="800" dirty="0"/>
+              <a:t>Knopf für Grünanforderung</a:t>
+            </a:r>
+          </a:p>
+        </p:txBody>
+      </p:sp>
+      <p:sp>
+        <p:nvSpPr>
+          <p:cNvPr id="212" name="Textfeld 211">
+            <a:extLst>
+              <a:ext uri="{FF2B5EF4-FFF2-40B4-BE49-F238E27FC236}">
+                <a16:creationId xmlns:a16="http://schemas.microsoft.com/office/drawing/2014/main" id="{6DEDAC23-4DC1-4053-ADC7-73F82FF8C284}"/>
+              </a:ext>
+            </a:extLst>
+          </p:cNvPr>
+          <p:cNvSpPr txBox="1"/>
+          <p:nvPr/>
+        </p:nvSpPr>
+        <p:spPr>
+          <a:xfrm>
+            <a:off x="685724" y="5800130"/>
+            <a:ext cx="663327" cy="215444"/>
+          </a:xfrm>
+          <a:prstGeom prst="rect">
+            <a:avLst/>
+          </a:prstGeom>
+          <a:noFill/>
+        </p:spPr>
+        <p:txBody>
+          <a:bodyPr wrap="square" rtlCol="0">
+            <a:spAutoFit/>
+          </a:bodyPr>
+          <a:lstStyle/>
+          <a:p>
+            <a:pPr algn="ctr"/>
+            <a:r>
+              <a:rPr lang="de-CH" sz="800" dirty="0"/>
+              <a:t>9V Batterie</a:t>
+            </a:r>
+          </a:p>
+        </p:txBody>
+      </p:sp>
+      <p:sp>
+        <p:nvSpPr>
+          <p:cNvPr id="213" name="Textfeld 212">
+            <a:extLst>
+              <a:ext uri="{FF2B5EF4-FFF2-40B4-BE49-F238E27FC236}">
+                <a16:creationId xmlns:a16="http://schemas.microsoft.com/office/drawing/2014/main" id="{B114BD1E-7708-4DC5-9D93-BC2B52D7CADA}"/>
+              </a:ext>
+            </a:extLst>
+          </p:cNvPr>
+          <p:cNvSpPr txBox="1"/>
+          <p:nvPr/>
+        </p:nvSpPr>
+        <p:spPr>
+          <a:xfrm>
+            <a:off x="2467586" y="4353283"/>
+            <a:ext cx="940770" cy="338554"/>
+          </a:xfrm>
+          <a:prstGeom prst="rect">
+            <a:avLst/>
+          </a:prstGeom>
+          <a:noFill/>
+        </p:spPr>
+        <p:txBody>
+          <a:bodyPr wrap="square" rtlCol="0">
+            <a:spAutoFit/>
+          </a:bodyPr>
+          <a:lstStyle/>
+          <a:p>
+            <a:pPr algn="ctr"/>
+            <a:r>
+              <a:rPr lang="de-CH" sz="800" b="1" dirty="0"/>
+              <a:t>Arduino</a:t>
+            </a:r>
+          </a:p>
+          <a:p>
+            <a:pPr algn="ctr"/>
+            <a:r>
+              <a:rPr lang="de-CH" sz="800" b="1" dirty="0"/>
+              <a:t>Ampelsteuerung</a:t>
+            </a:r>
+          </a:p>
+        </p:txBody>
+      </p:sp>
+      <p:sp>
+        <p:nvSpPr>
+          <p:cNvPr id="214" name="Textfeld 213">
+            <a:extLst>
+              <a:ext uri="{FF2B5EF4-FFF2-40B4-BE49-F238E27FC236}">
+                <a16:creationId xmlns:a16="http://schemas.microsoft.com/office/drawing/2014/main" id="{502BDBFA-24AB-48F1-9F96-39E0FFBC58DA}"/>
+              </a:ext>
+            </a:extLst>
+          </p:cNvPr>
+          <p:cNvSpPr txBox="1"/>
+          <p:nvPr/>
+        </p:nvSpPr>
+        <p:spPr>
+          <a:xfrm>
+            <a:off x="2466736" y="1875077"/>
+            <a:ext cx="940770" cy="215444"/>
+          </a:xfrm>
+          <a:prstGeom prst="rect">
+            <a:avLst/>
+          </a:prstGeom>
+          <a:noFill/>
+        </p:spPr>
+        <p:txBody>
+          <a:bodyPr wrap="square" rtlCol="0">
+            <a:spAutoFit/>
+          </a:bodyPr>
+          <a:lstStyle/>
+          <a:p>
+            <a:pPr algn="ctr"/>
+            <a:r>
+              <a:rPr lang="de-CH" sz="800" dirty="0"/>
+              <a:t>RESET-Knopf</a:t>
+            </a:r>
+          </a:p>
+        </p:txBody>
+      </p:sp>
+      <p:cxnSp>
+        <p:nvCxnSpPr>
+          <p:cNvPr id="160" name="Gerade Verbindung mit Pfeil 159">
+            <a:extLst>
+              <a:ext uri="{FF2B5EF4-FFF2-40B4-BE49-F238E27FC236}">
+                <a16:creationId xmlns:a16="http://schemas.microsoft.com/office/drawing/2014/main" id="{6FBBD216-F34B-409C-B2A3-EBFECFDEC32F}"/>
+              </a:ext>
+            </a:extLst>
+          </p:cNvPr>
+          <p:cNvCxnSpPr/>
+          <p:nvPr/>
+        </p:nvCxnSpPr>
+        <p:spPr>
+          <a:xfrm>
+            <a:off x="2937121" y="2057522"/>
+            <a:ext cx="0" cy="284027"/>
+          </a:xfrm>
+          <a:prstGeom prst="straightConnector1">
+            <a:avLst/>
+          </a:prstGeom>
+          <a:ln>
+            <a:tailEnd type="triangle"/>
+          </a:ln>
+        </p:spPr>
+        <p:style>
+          <a:lnRef idx="1">
+            <a:schemeClr val="accent1"/>
+          </a:lnRef>
+          <a:fillRef idx="0">
+            <a:schemeClr val="accent1"/>
+          </a:fillRef>
+          <a:effectRef idx="0">
+            <a:schemeClr val="accent1"/>
+          </a:effectRef>
+          <a:fontRef idx="minor">
+            <a:schemeClr val="tx1"/>
+          </a:fontRef>
+        </p:style>
+      </p:cxnSp>
+      <p:sp>
+        <p:nvSpPr>
+          <p:cNvPr id="220" name="Textfeld 219">
+            <a:extLst>
+              <a:ext uri="{FF2B5EF4-FFF2-40B4-BE49-F238E27FC236}">
+                <a16:creationId xmlns:a16="http://schemas.microsoft.com/office/drawing/2014/main" id="{F9E1FDB8-E5CC-4B57-B8BD-44ACB683799D}"/>
+              </a:ext>
+            </a:extLst>
+          </p:cNvPr>
+          <p:cNvSpPr txBox="1"/>
+          <p:nvPr/>
+        </p:nvSpPr>
+        <p:spPr>
+          <a:xfrm>
+            <a:off x="3671132" y="415359"/>
+            <a:ext cx="3833971" cy="584775"/>
+          </a:xfrm>
+          <a:prstGeom prst="rect">
+            <a:avLst/>
+          </a:prstGeom>
+          <a:noFill/>
+        </p:spPr>
+        <p:txBody>
+          <a:bodyPr wrap="square" rtlCol="0">
+            <a:spAutoFit/>
+          </a:bodyPr>
+          <a:lstStyle/>
+          <a:p>
+            <a:pPr algn="ctr"/>
+            <a:r>
+              <a:rPr lang="de-CH" sz="3200" b="1" u="sng" dirty="0"/>
+              <a:t>Fussgänger-Ampel</a:t>
+            </a:r>
+          </a:p>
+        </p:txBody>
+      </p:sp>
+      <p:cxnSp>
+        <p:nvCxnSpPr>
+          <p:cNvPr id="92" name="Gerader Verbinder 91">
+            <a:extLst>
+              <a:ext uri="{FF2B5EF4-FFF2-40B4-BE49-F238E27FC236}">
+                <a16:creationId xmlns:a16="http://schemas.microsoft.com/office/drawing/2014/main" id="{28A88A5E-7160-4825-BC29-6AACBEF13700}"/>
+              </a:ext>
+            </a:extLst>
+          </p:cNvPr>
+          <p:cNvCxnSpPr>
+            <a:cxnSpLocks/>
+          </p:cNvCxnSpPr>
+          <p:nvPr/>
+        </p:nvCxnSpPr>
+        <p:spPr>
+          <a:xfrm>
+            <a:off x="3414714" y="3508767"/>
+            <a:ext cx="188636" cy="0"/>
+          </a:xfrm>
+          <a:prstGeom prst="line">
+            <a:avLst/>
+          </a:prstGeom>
+          <a:ln w="19050">
+            <a:solidFill>
+              <a:schemeClr val="bg2">
+                <a:lumMod val="50000"/>
+              </a:schemeClr>
+            </a:solidFill>
+          </a:ln>
+        </p:spPr>
+        <p:style>
+          <a:lnRef idx="1">
+            <a:schemeClr val="accent1"/>
+          </a:lnRef>
+          <a:fillRef idx="0">
+            <a:schemeClr val="accent1"/>
+          </a:fillRef>
+          <a:effectRef idx="0">
+            <a:schemeClr val="accent1"/>
+          </a:effectRef>
+          <a:fontRef idx="minor">
+            <a:schemeClr val="tx1"/>
+          </a:fontRef>
+        </p:style>
+      </p:cxnSp>
+      <p:cxnSp>
+        <p:nvCxnSpPr>
+          <p:cNvPr id="97" name="Gerader Verbinder 96">
+            <a:extLst>
+              <a:ext uri="{FF2B5EF4-FFF2-40B4-BE49-F238E27FC236}">
+                <a16:creationId xmlns:a16="http://schemas.microsoft.com/office/drawing/2014/main" id="{AC0BF26F-BE17-4F2D-A4CE-4B4415EA21DF}"/>
+              </a:ext>
+            </a:extLst>
+          </p:cNvPr>
+          <p:cNvCxnSpPr>
+            <a:cxnSpLocks/>
+          </p:cNvCxnSpPr>
+          <p:nvPr/>
+        </p:nvCxnSpPr>
+        <p:spPr>
+          <a:xfrm>
+            <a:off x="5712823" y="5319300"/>
+            <a:ext cx="475252" cy="0"/>
+          </a:xfrm>
+          <a:prstGeom prst="line">
+            <a:avLst/>
+          </a:prstGeom>
+          <a:ln w="19050">
+            <a:solidFill>
+              <a:schemeClr val="bg2">
+                <a:lumMod val="50000"/>
+              </a:schemeClr>
+            </a:solidFill>
+          </a:ln>
+        </p:spPr>
+        <p:style>
+          <a:lnRef idx="1">
+            <a:schemeClr val="accent1"/>
+          </a:lnRef>
+          <a:fillRef idx="0">
+            <a:schemeClr val="accent1"/>
+          </a:fillRef>
+          <a:effectRef idx="0">
+            <a:schemeClr val="accent1"/>
+          </a:effectRef>
+          <a:fontRef idx="minor">
+            <a:schemeClr val="tx1"/>
+          </a:fontRef>
+        </p:style>
+      </p:cxnSp>
+      <p:sp>
+        <p:nvSpPr>
+          <p:cNvPr id="98" name="Ellipse 97">
+            <a:extLst>
+              <a:ext uri="{FF2B5EF4-FFF2-40B4-BE49-F238E27FC236}">
+                <a16:creationId xmlns:a16="http://schemas.microsoft.com/office/drawing/2014/main" id="{2C213785-7763-40F9-9E77-5DFA74CBDC0E}"/>
+              </a:ext>
+            </a:extLst>
+          </p:cNvPr>
+          <p:cNvSpPr/>
+          <p:nvPr/>
+        </p:nvSpPr>
+        <p:spPr>
+          <a:xfrm>
+            <a:off x="5687910" y="5232277"/>
             <a:ext cx="45719" cy="45719"/>
           </a:xfrm>
           <a:prstGeom prst="ellipse">
@@ -5994,787 +7014,12 @@
           </a:p>
         </p:txBody>
       </p:sp>
-      <p:cxnSp>
-        <p:nvCxnSpPr>
-          <p:cNvPr id="148" name="Gerader Verbinder 147">
-            <a:extLst>
-              <a:ext uri="{FF2B5EF4-FFF2-40B4-BE49-F238E27FC236}">
-                <a16:creationId xmlns:a16="http://schemas.microsoft.com/office/drawing/2014/main" id="{11734749-F04F-49AF-825D-677B97C68B5C}"/>
-              </a:ext>
-            </a:extLst>
-          </p:cNvPr>
-          <p:cNvCxnSpPr>
-            <a:cxnSpLocks/>
-          </p:cNvCxnSpPr>
-          <p:nvPr/>
-        </p:nvCxnSpPr>
-        <p:spPr>
-          <a:xfrm>
-            <a:off x="8551228" y="3264927"/>
-            <a:ext cx="297771" cy="1114"/>
-          </a:xfrm>
-          <a:prstGeom prst="line">
-            <a:avLst/>
-          </a:prstGeom>
-          <a:ln w="19050">
-            <a:solidFill>
-              <a:schemeClr val="bg2">
-                <a:lumMod val="50000"/>
-              </a:schemeClr>
-            </a:solidFill>
-          </a:ln>
-        </p:spPr>
-        <p:style>
-          <a:lnRef idx="1">
-            <a:schemeClr val="accent1"/>
-          </a:lnRef>
-          <a:fillRef idx="0">
-            <a:schemeClr val="accent1"/>
-          </a:fillRef>
-          <a:effectRef idx="0">
-            <a:schemeClr val="accent1"/>
-          </a:effectRef>
-          <a:fontRef idx="minor">
-            <a:schemeClr val="tx1"/>
-          </a:fontRef>
-        </p:style>
-      </p:cxnSp>
-      <p:sp>
-        <p:nvSpPr>
-          <p:cNvPr id="150" name="Ellipse 149">
-            <a:extLst>
-              <a:ext uri="{FF2B5EF4-FFF2-40B4-BE49-F238E27FC236}">
-                <a16:creationId xmlns:a16="http://schemas.microsoft.com/office/drawing/2014/main" id="{5B988D11-948B-4785-9B41-FD986091B3A5}"/>
-              </a:ext>
-            </a:extLst>
-          </p:cNvPr>
-          <p:cNvSpPr/>
-          <p:nvPr/>
-        </p:nvSpPr>
-        <p:spPr>
-          <a:xfrm>
-            <a:off x="8821693" y="3247921"/>
-            <a:ext cx="45719" cy="45719"/>
-          </a:xfrm>
-          <a:prstGeom prst="ellipse">
-            <a:avLst/>
-          </a:prstGeom>
-          <a:solidFill>
-            <a:schemeClr val="bg2">
-              <a:lumMod val="50000"/>
-            </a:schemeClr>
-          </a:solidFill>
-          <a:ln>
-            <a:solidFill>
-              <a:schemeClr val="bg2">
-                <a:lumMod val="50000"/>
-              </a:schemeClr>
-            </a:solidFill>
-          </a:ln>
-        </p:spPr>
-        <p:style>
-          <a:lnRef idx="2">
-            <a:schemeClr val="accent1">
-              <a:shade val="50000"/>
-            </a:schemeClr>
-          </a:lnRef>
-          <a:fillRef idx="1">
-            <a:schemeClr val="accent1"/>
-          </a:fillRef>
-          <a:effectRef idx="0">
-            <a:schemeClr val="accent1"/>
-          </a:effectRef>
-          <a:fontRef idx="minor">
-            <a:schemeClr val="lt1"/>
-          </a:fontRef>
-        </p:style>
-        <p:txBody>
-          <a:bodyPr rtlCol="0" anchor="ctr"/>
-          <a:lstStyle/>
-          <a:p>
-            <a:pPr algn="ctr"/>
-            <a:endParaRPr lang="de-CH"/>
-          </a:p>
-        </p:txBody>
-      </p:sp>
-      <p:cxnSp>
-        <p:nvCxnSpPr>
-          <p:cNvPr id="152" name="Gerader Verbinder 151">
-            <a:extLst>
-              <a:ext uri="{FF2B5EF4-FFF2-40B4-BE49-F238E27FC236}">
-                <a16:creationId xmlns:a16="http://schemas.microsoft.com/office/drawing/2014/main" id="{BE04A1EE-76B8-46D4-AC49-4DF8D34B2A54}"/>
-              </a:ext>
-            </a:extLst>
-          </p:cNvPr>
-          <p:cNvCxnSpPr>
-            <a:cxnSpLocks/>
-          </p:cNvCxnSpPr>
-          <p:nvPr/>
-        </p:nvCxnSpPr>
-        <p:spPr>
-          <a:xfrm>
-            <a:off x="6732630" y="5066599"/>
-            <a:ext cx="2571708" cy="0"/>
-          </a:xfrm>
-          <a:prstGeom prst="line">
-            <a:avLst/>
-          </a:prstGeom>
-          <a:ln w="19050">
-            <a:solidFill>
-              <a:schemeClr val="bg2">
-                <a:lumMod val="50000"/>
-              </a:schemeClr>
-            </a:solidFill>
-          </a:ln>
-        </p:spPr>
-        <p:style>
-          <a:lnRef idx="1">
-            <a:schemeClr val="accent1"/>
-          </a:lnRef>
-          <a:fillRef idx="0">
-            <a:schemeClr val="accent1"/>
-          </a:fillRef>
-          <a:effectRef idx="0">
-            <a:schemeClr val="accent1"/>
-          </a:effectRef>
-          <a:fontRef idx="minor">
-            <a:schemeClr val="tx1"/>
-          </a:fontRef>
-        </p:style>
-      </p:cxnSp>
-      <p:cxnSp>
-        <p:nvCxnSpPr>
-          <p:cNvPr id="153" name="Gerader Verbinder 152">
-            <a:extLst>
-              <a:ext uri="{FF2B5EF4-FFF2-40B4-BE49-F238E27FC236}">
-                <a16:creationId xmlns:a16="http://schemas.microsoft.com/office/drawing/2014/main" id="{450291D8-0B73-4A45-8B0C-E3BD065AB7F1}"/>
-              </a:ext>
-            </a:extLst>
-          </p:cNvPr>
-          <p:cNvCxnSpPr>
-            <a:cxnSpLocks/>
-          </p:cNvCxnSpPr>
-          <p:nvPr/>
-        </p:nvCxnSpPr>
-        <p:spPr>
-          <a:xfrm>
-            <a:off x="6723061" y="3264927"/>
-            <a:ext cx="2501" cy="1801672"/>
-          </a:xfrm>
-          <a:prstGeom prst="line">
-            <a:avLst/>
-          </a:prstGeom>
-          <a:ln w="19050">
-            <a:solidFill>
-              <a:schemeClr val="bg2">
-                <a:lumMod val="50000"/>
-              </a:schemeClr>
-            </a:solidFill>
-          </a:ln>
-        </p:spPr>
-        <p:style>
-          <a:lnRef idx="1">
-            <a:schemeClr val="accent1"/>
-          </a:lnRef>
-          <a:fillRef idx="0">
-            <a:schemeClr val="accent1"/>
-          </a:fillRef>
-          <a:effectRef idx="0">
-            <a:schemeClr val="accent1"/>
-          </a:effectRef>
-          <a:fontRef idx="minor">
-            <a:schemeClr val="tx1"/>
-          </a:fontRef>
-        </p:style>
-      </p:cxnSp>
-      <p:cxnSp>
-        <p:nvCxnSpPr>
-          <p:cNvPr id="165" name="Gerader Verbinder 164">
-            <a:extLst>
-              <a:ext uri="{FF2B5EF4-FFF2-40B4-BE49-F238E27FC236}">
-                <a16:creationId xmlns:a16="http://schemas.microsoft.com/office/drawing/2014/main" id="{36819C6C-8BC0-41E6-BEB8-A261E8ECECD7}"/>
-              </a:ext>
-            </a:extLst>
-          </p:cNvPr>
-          <p:cNvCxnSpPr>
-            <a:cxnSpLocks/>
-          </p:cNvCxnSpPr>
-          <p:nvPr/>
-        </p:nvCxnSpPr>
-        <p:spPr>
-          <a:xfrm>
-            <a:off x="5419474" y="5145974"/>
-            <a:ext cx="3884864" cy="0"/>
-          </a:xfrm>
-          <a:prstGeom prst="line">
-            <a:avLst/>
-          </a:prstGeom>
-          <a:ln w="19050">
-            <a:solidFill>
-              <a:schemeClr val="bg2">
-                <a:lumMod val="50000"/>
-              </a:schemeClr>
-            </a:solidFill>
-          </a:ln>
-        </p:spPr>
-        <p:style>
-          <a:lnRef idx="1">
-            <a:schemeClr val="accent1"/>
-          </a:lnRef>
-          <a:fillRef idx="0">
-            <a:schemeClr val="accent1"/>
-          </a:fillRef>
-          <a:effectRef idx="0">
-            <a:schemeClr val="accent1"/>
-          </a:effectRef>
-          <a:fontRef idx="minor">
-            <a:schemeClr val="tx1"/>
-          </a:fontRef>
-        </p:style>
-      </p:cxnSp>
-      <p:cxnSp>
-        <p:nvCxnSpPr>
-          <p:cNvPr id="167" name="Gerader Verbinder 166">
-            <a:extLst>
-              <a:ext uri="{FF2B5EF4-FFF2-40B4-BE49-F238E27FC236}">
-                <a16:creationId xmlns:a16="http://schemas.microsoft.com/office/drawing/2014/main" id="{1232FC12-2CA1-47ED-A847-4CBBFDD33FAC}"/>
-              </a:ext>
-            </a:extLst>
-          </p:cNvPr>
-          <p:cNvCxnSpPr>
-            <a:cxnSpLocks/>
-          </p:cNvCxnSpPr>
-          <p:nvPr/>
-        </p:nvCxnSpPr>
-        <p:spPr>
-          <a:xfrm flipV="1">
-            <a:off x="5419474" y="3420534"/>
-            <a:ext cx="0" cy="1725440"/>
-          </a:xfrm>
-          <a:prstGeom prst="line">
-            <a:avLst/>
-          </a:prstGeom>
-          <a:ln w="19050">
-            <a:solidFill>
-              <a:schemeClr val="bg2">
-                <a:lumMod val="50000"/>
-              </a:schemeClr>
-            </a:solidFill>
-          </a:ln>
-        </p:spPr>
-        <p:style>
-          <a:lnRef idx="1">
-            <a:schemeClr val="accent1"/>
-          </a:lnRef>
-          <a:fillRef idx="0">
-            <a:schemeClr val="accent1"/>
-          </a:fillRef>
-          <a:effectRef idx="0">
-            <a:schemeClr val="accent1"/>
-          </a:effectRef>
-          <a:fontRef idx="minor">
-            <a:schemeClr val="tx1"/>
-          </a:fontRef>
-        </p:style>
-      </p:cxnSp>
-      <p:cxnSp>
-        <p:nvCxnSpPr>
-          <p:cNvPr id="171" name="Gerader Verbinder 170">
-            <a:extLst>
-              <a:ext uri="{FF2B5EF4-FFF2-40B4-BE49-F238E27FC236}">
-                <a16:creationId xmlns:a16="http://schemas.microsoft.com/office/drawing/2014/main" id="{4DEF2DEA-DC36-435E-984E-57397B359A6A}"/>
-              </a:ext>
-            </a:extLst>
-          </p:cNvPr>
-          <p:cNvCxnSpPr>
-            <a:cxnSpLocks/>
-          </p:cNvCxnSpPr>
-          <p:nvPr/>
-        </p:nvCxnSpPr>
-        <p:spPr>
-          <a:xfrm>
-            <a:off x="5419474" y="3420534"/>
-            <a:ext cx="216525" cy="0"/>
-          </a:xfrm>
-          <a:prstGeom prst="line">
-            <a:avLst/>
-          </a:prstGeom>
-          <a:ln w="19050">
-            <a:solidFill>
-              <a:schemeClr val="bg2">
-                <a:lumMod val="50000"/>
-              </a:schemeClr>
-            </a:solidFill>
-          </a:ln>
-        </p:spPr>
-        <p:style>
-          <a:lnRef idx="1">
-            <a:schemeClr val="accent1"/>
-          </a:lnRef>
-          <a:fillRef idx="0">
-            <a:schemeClr val="accent1"/>
-          </a:fillRef>
-          <a:effectRef idx="0">
-            <a:schemeClr val="accent1"/>
-          </a:effectRef>
-          <a:fontRef idx="minor">
-            <a:schemeClr val="tx1"/>
-          </a:fontRef>
-        </p:style>
-      </p:cxnSp>
-      <p:sp>
-        <p:nvSpPr>
-          <p:cNvPr id="133" name="Rechteck 132">
-            <a:extLst>
-              <a:ext uri="{FF2B5EF4-FFF2-40B4-BE49-F238E27FC236}">
-                <a16:creationId xmlns:a16="http://schemas.microsoft.com/office/drawing/2014/main" id="{6049FE96-DED3-4701-8D0C-7DEB2B2A09EF}"/>
-              </a:ext>
-            </a:extLst>
-          </p:cNvPr>
-          <p:cNvSpPr/>
-          <p:nvPr/>
-        </p:nvSpPr>
-        <p:spPr>
-          <a:xfrm>
-            <a:off x="9144828" y="1304925"/>
-            <a:ext cx="492910" cy="1124215"/>
-          </a:xfrm>
-          <a:prstGeom prst="rect">
-            <a:avLst/>
-          </a:prstGeom>
-          <a:solidFill>
-            <a:schemeClr val="bg2">
-              <a:lumMod val="75000"/>
-              <a:alpha val="47000"/>
-            </a:schemeClr>
-          </a:solidFill>
-          <a:ln>
-            <a:noFill/>
-          </a:ln>
-        </p:spPr>
-        <p:style>
-          <a:lnRef idx="2">
-            <a:schemeClr val="accent1">
-              <a:shade val="50000"/>
-            </a:schemeClr>
-          </a:lnRef>
-          <a:fillRef idx="1">
-            <a:schemeClr val="accent1"/>
-          </a:fillRef>
-          <a:effectRef idx="0">
-            <a:schemeClr val="accent1"/>
-          </a:effectRef>
-          <a:fontRef idx="minor">
-            <a:schemeClr val="lt1"/>
-          </a:fontRef>
-        </p:style>
-        <p:txBody>
-          <a:bodyPr rtlCol="0" anchor="ctr"/>
-          <a:lstStyle/>
-          <a:p>
-            <a:pPr algn="ctr"/>
-            <a:endParaRPr lang="de-CH"/>
-          </a:p>
-        </p:txBody>
-      </p:sp>
-      <p:sp>
-        <p:nvSpPr>
-          <p:cNvPr id="177" name="Rechteck 176">
-            <a:extLst>
-              <a:ext uri="{FF2B5EF4-FFF2-40B4-BE49-F238E27FC236}">
-                <a16:creationId xmlns:a16="http://schemas.microsoft.com/office/drawing/2014/main" id="{C6D90BF7-0C4D-4661-8658-6C188A048C91}"/>
-              </a:ext>
-            </a:extLst>
-          </p:cNvPr>
-          <p:cNvSpPr/>
-          <p:nvPr/>
-        </p:nvSpPr>
-        <p:spPr>
-          <a:xfrm>
-            <a:off x="9142505" y="3678309"/>
-            <a:ext cx="492910" cy="1039253"/>
-          </a:xfrm>
-          <a:prstGeom prst="rect">
-            <a:avLst/>
-          </a:prstGeom>
-          <a:solidFill>
-            <a:schemeClr val="bg2">
-              <a:lumMod val="75000"/>
-              <a:alpha val="47000"/>
-            </a:schemeClr>
-          </a:solidFill>
-          <a:ln>
-            <a:noFill/>
-          </a:ln>
-        </p:spPr>
-        <p:style>
-          <a:lnRef idx="2">
-            <a:schemeClr val="accent1">
-              <a:shade val="50000"/>
-            </a:schemeClr>
-          </a:lnRef>
-          <a:fillRef idx="1">
-            <a:schemeClr val="accent1"/>
-          </a:fillRef>
-          <a:effectRef idx="0">
-            <a:schemeClr val="accent1"/>
-          </a:effectRef>
-          <a:fontRef idx="minor">
-            <a:schemeClr val="lt1"/>
-          </a:fontRef>
-        </p:style>
-        <p:txBody>
-          <a:bodyPr rtlCol="0" anchor="ctr"/>
-          <a:lstStyle/>
-          <a:p>
-            <a:pPr algn="ctr"/>
-            <a:endParaRPr lang="de-CH"/>
-          </a:p>
-        </p:txBody>
-      </p:sp>
-      <p:sp>
-        <p:nvSpPr>
-          <p:cNvPr id="184" name="Rechteck 183">
-            <a:extLst>
-              <a:ext uri="{FF2B5EF4-FFF2-40B4-BE49-F238E27FC236}">
-                <a16:creationId xmlns:a16="http://schemas.microsoft.com/office/drawing/2014/main" id="{FF2DB5F5-780D-4F95-90B4-79251A9A2BEA}"/>
-              </a:ext>
-            </a:extLst>
-          </p:cNvPr>
-          <p:cNvSpPr/>
-          <p:nvPr/>
-        </p:nvSpPr>
-        <p:spPr>
-          <a:xfrm>
-            <a:off x="9342130" y="2429140"/>
-            <a:ext cx="118961" cy="835787"/>
-          </a:xfrm>
-          <a:prstGeom prst="rect">
-            <a:avLst/>
-          </a:prstGeom>
-          <a:solidFill>
-            <a:schemeClr val="bg2">
-              <a:lumMod val="75000"/>
-              <a:alpha val="47000"/>
-            </a:schemeClr>
-          </a:solidFill>
-          <a:ln>
-            <a:noFill/>
-          </a:ln>
-        </p:spPr>
-        <p:style>
-          <a:lnRef idx="2">
-            <a:schemeClr val="accent1">
-              <a:shade val="50000"/>
-            </a:schemeClr>
-          </a:lnRef>
-          <a:fillRef idx="1">
-            <a:schemeClr val="accent1"/>
-          </a:fillRef>
-          <a:effectRef idx="0">
-            <a:schemeClr val="accent1"/>
-          </a:effectRef>
-          <a:fontRef idx="minor">
-            <a:schemeClr val="lt1"/>
-          </a:fontRef>
-        </p:style>
-        <p:txBody>
-          <a:bodyPr rtlCol="0" anchor="ctr"/>
-          <a:lstStyle/>
-          <a:p>
-            <a:pPr algn="ctr"/>
-            <a:endParaRPr lang="de-CH"/>
-          </a:p>
-        </p:txBody>
-      </p:sp>
-      <p:sp>
-        <p:nvSpPr>
-          <p:cNvPr id="185" name="Rechteck 184">
-            <a:extLst>
-              <a:ext uri="{FF2B5EF4-FFF2-40B4-BE49-F238E27FC236}">
-                <a16:creationId xmlns:a16="http://schemas.microsoft.com/office/drawing/2014/main" id="{B5902E9C-61FA-4B4F-A758-6624C655F170}"/>
-              </a:ext>
-            </a:extLst>
-          </p:cNvPr>
-          <p:cNvSpPr/>
-          <p:nvPr/>
-        </p:nvSpPr>
-        <p:spPr>
-          <a:xfrm>
-            <a:off x="9342131" y="4717562"/>
-            <a:ext cx="125102" cy="1039247"/>
-          </a:xfrm>
-          <a:prstGeom prst="rect">
-            <a:avLst/>
-          </a:prstGeom>
-          <a:solidFill>
-            <a:schemeClr val="bg2">
-              <a:lumMod val="75000"/>
-              <a:alpha val="47000"/>
-            </a:schemeClr>
-          </a:solidFill>
-          <a:ln>
-            <a:noFill/>
-          </a:ln>
-        </p:spPr>
-        <p:style>
-          <a:lnRef idx="2">
-            <a:schemeClr val="accent1">
-              <a:shade val="50000"/>
-            </a:schemeClr>
-          </a:lnRef>
-          <a:fillRef idx="1">
-            <a:schemeClr val="accent1"/>
-          </a:fillRef>
-          <a:effectRef idx="0">
-            <a:schemeClr val="accent1"/>
-          </a:effectRef>
-          <a:fontRef idx="minor">
-            <a:schemeClr val="lt1"/>
-          </a:fontRef>
-        </p:style>
-        <p:txBody>
-          <a:bodyPr rtlCol="0" anchor="ctr"/>
-          <a:lstStyle/>
-          <a:p>
-            <a:pPr algn="ctr"/>
-            <a:endParaRPr lang="de-CH"/>
-          </a:p>
-        </p:txBody>
-      </p:sp>
-      <p:pic>
-        <p:nvPicPr>
-          <p:cNvPr id="144" name="Picture 6" descr="9V Block Batterie &amp; Akku Test | akkuline.de">
-            <a:extLst>
-              <a:ext uri="{FF2B5EF4-FFF2-40B4-BE49-F238E27FC236}">
-                <a16:creationId xmlns:a16="http://schemas.microsoft.com/office/drawing/2014/main" id="{810714A8-B88A-4A47-A596-471977890C16}"/>
-              </a:ext>
-            </a:extLst>
-          </p:cNvPr>
-          <p:cNvPicPr>
-            <a:picLocks noChangeAspect="1" noChangeArrowheads="1"/>
-          </p:cNvPicPr>
-          <p:nvPr/>
-        </p:nvPicPr>
-        <p:blipFill>
-          <a:blip r:embed="rId6">
-            <a:extLst>
-              <a:ext uri="{28A0092B-C50C-407E-A947-70E740481C1C}">
-                <a14:useLocalDpi xmlns:a14="http://schemas.microsoft.com/office/drawing/2010/main" val="0"/>
-              </a:ext>
-            </a:extLst>
-          </a:blip>
-          <a:srcRect/>
-          <a:stretch>
-            <a:fillRect/>
-          </a:stretch>
-        </p:blipFill>
-        <p:spPr bwMode="auto">
-          <a:xfrm>
-            <a:off x="2940907" y="3992955"/>
-            <a:ext cx="2147287" cy="2147287"/>
-          </a:xfrm>
-          <a:prstGeom prst="rect">
-            <a:avLst/>
-          </a:prstGeom>
-          <a:noFill/>
-          <a:extLst>
-            <a:ext uri="{909E8E84-426E-40DD-AFC4-6F175D3DCCD1}">
-              <a14:hiddenFill xmlns:a14="http://schemas.microsoft.com/office/drawing/2010/main">
-                <a:solidFill>
-                  <a:srgbClr val="FFFFFF"/>
-                </a:solidFill>
-              </a14:hiddenFill>
-            </a:ext>
-          </a:extLst>
-        </p:spPr>
-      </p:pic>
-      <p:cxnSp>
-        <p:nvCxnSpPr>
-          <p:cNvPr id="188" name="Gerader Verbinder 187">
-            <a:extLst>
-              <a:ext uri="{FF2B5EF4-FFF2-40B4-BE49-F238E27FC236}">
-                <a16:creationId xmlns:a16="http://schemas.microsoft.com/office/drawing/2014/main" id="{733AEF3B-20A4-48F4-A59A-83341AD6CC1C}"/>
-              </a:ext>
-            </a:extLst>
-          </p:cNvPr>
-          <p:cNvCxnSpPr>
-            <a:cxnSpLocks/>
-          </p:cNvCxnSpPr>
-          <p:nvPr/>
-        </p:nvCxnSpPr>
-        <p:spPr>
-          <a:xfrm flipV="1">
-            <a:off x="3820855" y="3711503"/>
-            <a:ext cx="0" cy="377897"/>
-          </a:xfrm>
-          <a:prstGeom prst="line">
-            <a:avLst/>
-          </a:prstGeom>
-          <a:ln w="19050">
-            <a:solidFill>
-              <a:schemeClr val="bg2">
-                <a:lumMod val="50000"/>
-              </a:schemeClr>
-            </a:solidFill>
-          </a:ln>
-        </p:spPr>
-        <p:style>
-          <a:lnRef idx="1">
-            <a:schemeClr val="accent1"/>
-          </a:lnRef>
-          <a:fillRef idx="0">
-            <a:schemeClr val="accent1"/>
-          </a:fillRef>
-          <a:effectRef idx="0">
-            <a:schemeClr val="accent1"/>
-          </a:effectRef>
-          <a:fontRef idx="minor">
-            <a:schemeClr val="tx1"/>
-          </a:fontRef>
-        </p:style>
-      </p:cxnSp>
-      <p:cxnSp>
-        <p:nvCxnSpPr>
-          <p:cNvPr id="189" name="Gerader Verbinder 188">
-            <a:extLst>
-              <a:ext uri="{FF2B5EF4-FFF2-40B4-BE49-F238E27FC236}">
-                <a16:creationId xmlns:a16="http://schemas.microsoft.com/office/drawing/2014/main" id="{3C8DCF77-037D-4198-8B85-333682BF7B93}"/>
-              </a:ext>
-            </a:extLst>
-          </p:cNvPr>
-          <p:cNvCxnSpPr>
-            <a:cxnSpLocks/>
-          </p:cNvCxnSpPr>
-          <p:nvPr/>
-        </p:nvCxnSpPr>
-        <p:spPr>
-          <a:xfrm>
-            <a:off x="3815004" y="3711503"/>
-            <a:ext cx="1820995" cy="0"/>
-          </a:xfrm>
-          <a:prstGeom prst="line">
-            <a:avLst/>
-          </a:prstGeom>
-          <a:ln w="19050">
-            <a:solidFill>
-              <a:schemeClr val="bg2">
-                <a:lumMod val="50000"/>
-              </a:schemeClr>
-            </a:solidFill>
-          </a:ln>
-        </p:spPr>
-        <p:style>
-          <a:lnRef idx="1">
-            <a:schemeClr val="accent1"/>
-          </a:lnRef>
-          <a:fillRef idx="0">
-            <a:schemeClr val="accent1"/>
-          </a:fillRef>
-          <a:effectRef idx="0">
-            <a:schemeClr val="accent1"/>
-          </a:effectRef>
-          <a:fontRef idx="minor">
-            <a:schemeClr val="tx1"/>
-          </a:fontRef>
-        </p:style>
-      </p:cxnSp>
-      <p:cxnSp>
-        <p:nvCxnSpPr>
-          <p:cNvPr id="196" name="Gerader Verbinder 195">
-            <a:extLst>
-              <a:ext uri="{FF2B5EF4-FFF2-40B4-BE49-F238E27FC236}">
-                <a16:creationId xmlns:a16="http://schemas.microsoft.com/office/drawing/2014/main" id="{3CDBBF8D-4C83-42B6-B81A-A498B29638EE}"/>
-              </a:ext>
-            </a:extLst>
-          </p:cNvPr>
-          <p:cNvCxnSpPr>
-            <a:cxnSpLocks/>
-          </p:cNvCxnSpPr>
-          <p:nvPr/>
-        </p:nvCxnSpPr>
-        <p:spPr>
-          <a:xfrm>
-            <a:off x="4298103" y="3865714"/>
-            <a:ext cx="1337896" cy="0"/>
-          </a:xfrm>
-          <a:prstGeom prst="line">
-            <a:avLst/>
-          </a:prstGeom>
-          <a:ln w="19050">
-            <a:solidFill>
-              <a:schemeClr val="bg2">
-                <a:lumMod val="50000"/>
-              </a:schemeClr>
-            </a:solidFill>
-          </a:ln>
-        </p:spPr>
-        <p:style>
-          <a:lnRef idx="1">
-            <a:schemeClr val="accent1"/>
-          </a:lnRef>
-          <a:fillRef idx="0">
-            <a:schemeClr val="accent1"/>
-          </a:fillRef>
-          <a:effectRef idx="0">
-            <a:schemeClr val="accent1"/>
-          </a:effectRef>
-          <a:fontRef idx="minor">
-            <a:schemeClr val="tx1"/>
-          </a:fontRef>
-        </p:style>
-      </p:cxnSp>
-      <p:cxnSp>
-        <p:nvCxnSpPr>
-          <p:cNvPr id="198" name="Gerader Verbinder 197">
-            <a:extLst>
-              <a:ext uri="{FF2B5EF4-FFF2-40B4-BE49-F238E27FC236}">
-                <a16:creationId xmlns:a16="http://schemas.microsoft.com/office/drawing/2014/main" id="{3E492A85-DA86-44A1-A7FD-362D8C46FAFE}"/>
-              </a:ext>
-            </a:extLst>
-          </p:cNvPr>
-          <p:cNvCxnSpPr>
-            <a:cxnSpLocks/>
-          </p:cNvCxnSpPr>
-          <p:nvPr/>
-        </p:nvCxnSpPr>
-        <p:spPr>
-          <a:xfrm flipV="1">
-            <a:off x="4298103" y="3865714"/>
-            <a:ext cx="0" cy="235526"/>
-          </a:xfrm>
-          <a:prstGeom prst="line">
-            <a:avLst/>
-          </a:prstGeom>
-          <a:ln w="19050">
-            <a:solidFill>
-              <a:schemeClr val="bg2">
-                <a:lumMod val="50000"/>
-              </a:schemeClr>
-            </a:solidFill>
-          </a:ln>
-        </p:spPr>
-        <p:style>
-          <a:lnRef idx="1">
-            <a:schemeClr val="accent1"/>
-          </a:lnRef>
-          <a:fillRef idx="0">
-            <a:schemeClr val="accent1"/>
-          </a:fillRef>
-          <a:effectRef idx="0">
-            <a:schemeClr val="accent1"/>
-          </a:effectRef>
-          <a:fontRef idx="minor">
-            <a:schemeClr val="tx1"/>
-          </a:fontRef>
-        </p:style>
-      </p:cxnSp>
-      <p:sp>
-        <p:nvSpPr>
-          <p:cNvPr id="158" name="Textfeld 157">
-            <a:extLst>
-              <a:ext uri="{FF2B5EF4-FFF2-40B4-BE49-F238E27FC236}">
-                <a16:creationId xmlns:a16="http://schemas.microsoft.com/office/drawing/2014/main" id="{79FFBAF6-F242-48CA-B0C5-8C14F583A146}"/>
+      <p:sp>
+        <p:nvSpPr>
+          <p:cNvPr id="16" name="Textfeld 15">
+            <a:extLst>
+              <a:ext uri="{FF2B5EF4-FFF2-40B4-BE49-F238E27FC236}">
+                <a16:creationId xmlns:a16="http://schemas.microsoft.com/office/drawing/2014/main" id="{E5D1FAC3-A119-458A-A569-9E32D2DDEC66}"/>
               </a:ext>
             </a:extLst>
           </p:cNvPr>
@@ -6783,8 +7028,8 @@
         </p:nvSpPr>
         <p:spPr>
           <a:xfrm>
-            <a:off x="8029148" y="3236906"/>
-            <a:ext cx="758527" cy="215444"/>
+            <a:off x="8107680" y="5821294"/>
+            <a:ext cx="4007611" cy="307777"/>
           </a:xfrm>
           <a:prstGeom prst="rect">
             <a:avLst/>
@@ -6798,18 +7043,21 @@
           <a:lstStyle/>
           <a:p>
             <a:r>
-              <a:rPr lang="de-CH" sz="800" dirty="0"/>
-              <a:t>10k Ohm</a:t>
-            </a:r>
-          </a:p>
-        </p:txBody>
-      </p:sp>
-      <p:sp>
-        <p:nvSpPr>
-          <p:cNvPr id="201" name="Textfeld 200">
-            <a:extLst>
-              <a:ext uri="{FF2B5EF4-FFF2-40B4-BE49-F238E27FC236}">
-                <a16:creationId xmlns:a16="http://schemas.microsoft.com/office/drawing/2014/main" id="{6AD28ACE-CA4D-4C7C-A75A-E262A20E2A40}"/>
+              <a:rPr lang="de-CH" sz="1400" dirty="0">
+                <a:hlinkClick r:id="rId7"/>
+              </a:rPr>
+              <a:t>https://github.com/helijunky/Ampel</a:t>
+            </a:r>
+            <a:endParaRPr lang="de-CH" sz="1400" dirty="0"/>
+          </a:p>
+        </p:txBody>
+      </p:sp>
+      <p:sp>
+        <p:nvSpPr>
+          <p:cNvPr id="20" name="Textfeld 19">
+            <a:extLst>
+              <a:ext uri="{FF2B5EF4-FFF2-40B4-BE49-F238E27FC236}">
+                <a16:creationId xmlns:a16="http://schemas.microsoft.com/office/drawing/2014/main" id="{9B7A6197-1F03-4AE7-AE06-8179B1D6FC59}"/>
               </a:ext>
             </a:extLst>
           </p:cNvPr>
@@ -6818,8 +7066,8 @@
         </p:nvSpPr>
         <p:spPr>
           <a:xfrm>
-            <a:off x="7997934" y="1474095"/>
-            <a:ext cx="604619" cy="215444"/>
+            <a:off x="8107680" y="1371600"/>
+            <a:ext cx="3556212" cy="5047536"/>
           </a:xfrm>
           <a:prstGeom prst="rect">
             <a:avLst/>
@@ -6833,524 +7081,67 @@
           <a:lstStyle/>
           <a:p>
             <a:r>
-              <a:rPr lang="de-CH" sz="800" dirty="0"/>
-              <a:t>130 Ohm</a:t>
-            </a:r>
-          </a:p>
-        </p:txBody>
-      </p:sp>
-      <p:sp>
-        <p:nvSpPr>
-          <p:cNvPr id="202" name="Textfeld 201">
-            <a:extLst>
-              <a:ext uri="{FF2B5EF4-FFF2-40B4-BE49-F238E27FC236}">
-                <a16:creationId xmlns:a16="http://schemas.microsoft.com/office/drawing/2014/main" id="{CB147F44-7878-4460-8DCA-83E2EE7BE4BC}"/>
-              </a:ext>
-            </a:extLst>
-          </p:cNvPr>
-          <p:cNvSpPr txBox="1"/>
-          <p:nvPr/>
-        </p:nvSpPr>
-        <p:spPr>
-          <a:xfrm>
-            <a:off x="7997934" y="1813682"/>
-            <a:ext cx="604619" cy="215444"/>
-          </a:xfrm>
-          <a:prstGeom prst="rect">
-            <a:avLst/>
-          </a:prstGeom>
-          <a:noFill/>
-        </p:spPr>
-        <p:txBody>
-          <a:bodyPr wrap="square" rtlCol="0">
-            <a:spAutoFit/>
-          </a:bodyPr>
-          <a:lstStyle/>
-          <a:p>
-            <a:r>
-              <a:rPr lang="de-CH" sz="800" dirty="0"/>
-              <a:t>130 Ohm</a:t>
-            </a:r>
-          </a:p>
-        </p:txBody>
-      </p:sp>
-      <p:sp>
-        <p:nvSpPr>
-          <p:cNvPr id="203" name="Textfeld 202">
-            <a:extLst>
-              <a:ext uri="{FF2B5EF4-FFF2-40B4-BE49-F238E27FC236}">
-                <a16:creationId xmlns:a16="http://schemas.microsoft.com/office/drawing/2014/main" id="{B3D59F56-ADC2-4826-8D27-03B253B7C39D}"/>
-              </a:ext>
-            </a:extLst>
-          </p:cNvPr>
-          <p:cNvSpPr txBox="1"/>
-          <p:nvPr/>
-        </p:nvSpPr>
-        <p:spPr>
-          <a:xfrm>
-            <a:off x="7997934" y="2135201"/>
-            <a:ext cx="604619" cy="215444"/>
-          </a:xfrm>
-          <a:prstGeom prst="rect">
-            <a:avLst/>
-          </a:prstGeom>
-          <a:noFill/>
-        </p:spPr>
-        <p:txBody>
-          <a:bodyPr wrap="square" rtlCol="0">
-            <a:spAutoFit/>
-          </a:bodyPr>
-          <a:lstStyle/>
-          <a:p>
-            <a:r>
-              <a:rPr lang="de-CH" sz="800" dirty="0"/>
-              <a:t>130 Ohm</a:t>
-            </a:r>
-          </a:p>
-        </p:txBody>
-      </p:sp>
-      <p:sp>
-        <p:nvSpPr>
-          <p:cNvPr id="204" name="Textfeld 203">
-            <a:extLst>
-              <a:ext uri="{FF2B5EF4-FFF2-40B4-BE49-F238E27FC236}">
-                <a16:creationId xmlns:a16="http://schemas.microsoft.com/office/drawing/2014/main" id="{22495EBA-00AF-461A-AAA3-F3474F2F2FDF}"/>
-              </a:ext>
-            </a:extLst>
-          </p:cNvPr>
-          <p:cNvSpPr txBox="1"/>
-          <p:nvPr/>
-        </p:nvSpPr>
-        <p:spPr>
-          <a:xfrm>
-            <a:off x="8026166" y="3806399"/>
-            <a:ext cx="604619" cy="215444"/>
-          </a:xfrm>
-          <a:prstGeom prst="rect">
-            <a:avLst/>
-          </a:prstGeom>
-          <a:noFill/>
-        </p:spPr>
-        <p:txBody>
-          <a:bodyPr wrap="square" rtlCol="0">
-            <a:spAutoFit/>
-          </a:bodyPr>
-          <a:lstStyle/>
-          <a:p>
-            <a:r>
-              <a:rPr lang="de-CH" sz="800" dirty="0"/>
-              <a:t>130 Ohm</a:t>
-            </a:r>
-          </a:p>
-        </p:txBody>
-      </p:sp>
-      <p:sp>
-        <p:nvSpPr>
-          <p:cNvPr id="205" name="Textfeld 204">
-            <a:extLst>
-              <a:ext uri="{FF2B5EF4-FFF2-40B4-BE49-F238E27FC236}">
-                <a16:creationId xmlns:a16="http://schemas.microsoft.com/office/drawing/2014/main" id="{1AA7507D-25F9-4497-997A-983AB88D3017}"/>
-              </a:ext>
-            </a:extLst>
-          </p:cNvPr>
-          <p:cNvSpPr txBox="1"/>
-          <p:nvPr/>
-        </p:nvSpPr>
-        <p:spPr>
-          <a:xfrm>
-            <a:off x="8026166" y="4145986"/>
-            <a:ext cx="604619" cy="215444"/>
-          </a:xfrm>
-          <a:prstGeom prst="rect">
-            <a:avLst/>
-          </a:prstGeom>
-          <a:noFill/>
-        </p:spPr>
-        <p:txBody>
-          <a:bodyPr wrap="square" rtlCol="0">
-            <a:spAutoFit/>
-          </a:bodyPr>
-          <a:lstStyle/>
-          <a:p>
-            <a:r>
-              <a:rPr lang="de-CH" sz="800" dirty="0"/>
-              <a:t>130 Ohm</a:t>
-            </a:r>
-          </a:p>
-        </p:txBody>
-      </p:sp>
-      <p:sp>
-        <p:nvSpPr>
-          <p:cNvPr id="206" name="Textfeld 205">
-            <a:extLst>
-              <a:ext uri="{FF2B5EF4-FFF2-40B4-BE49-F238E27FC236}">
-                <a16:creationId xmlns:a16="http://schemas.microsoft.com/office/drawing/2014/main" id="{3F9CCF01-F39A-4A94-BF53-686B01896B89}"/>
-              </a:ext>
-            </a:extLst>
-          </p:cNvPr>
-          <p:cNvSpPr txBox="1"/>
-          <p:nvPr/>
-        </p:nvSpPr>
-        <p:spPr>
-          <a:xfrm>
-            <a:off x="8026166" y="4467505"/>
-            <a:ext cx="604619" cy="215444"/>
-          </a:xfrm>
-          <a:prstGeom prst="rect">
-            <a:avLst/>
-          </a:prstGeom>
-          <a:noFill/>
-        </p:spPr>
-        <p:txBody>
-          <a:bodyPr wrap="square" rtlCol="0">
-            <a:spAutoFit/>
-          </a:bodyPr>
-          <a:lstStyle/>
-          <a:p>
-            <a:r>
-              <a:rPr lang="de-CH" sz="800" dirty="0"/>
-              <a:t>130 Ohm</a:t>
-            </a:r>
-          </a:p>
-        </p:txBody>
-      </p:sp>
-      <p:sp>
-        <p:nvSpPr>
-          <p:cNvPr id="208" name="Textfeld 207">
-            <a:extLst>
-              <a:ext uri="{FF2B5EF4-FFF2-40B4-BE49-F238E27FC236}">
-                <a16:creationId xmlns:a16="http://schemas.microsoft.com/office/drawing/2014/main" id="{08509AE2-C157-45D5-A76D-C3AFE527373B}"/>
-              </a:ext>
-            </a:extLst>
-          </p:cNvPr>
-          <p:cNvSpPr txBox="1"/>
-          <p:nvPr/>
-        </p:nvSpPr>
-        <p:spPr>
-          <a:xfrm>
-            <a:off x="8011321" y="4805317"/>
-            <a:ext cx="604619" cy="215444"/>
-          </a:xfrm>
-          <a:prstGeom prst="rect">
-            <a:avLst/>
-          </a:prstGeom>
-          <a:noFill/>
-        </p:spPr>
-        <p:txBody>
-          <a:bodyPr wrap="square" rtlCol="0">
-            <a:spAutoFit/>
-          </a:bodyPr>
-          <a:lstStyle/>
-          <a:p>
-            <a:r>
-              <a:rPr lang="de-CH" sz="800" dirty="0"/>
-              <a:t>130 Ohm</a:t>
-            </a:r>
-          </a:p>
-        </p:txBody>
-      </p:sp>
-      <p:sp>
-        <p:nvSpPr>
-          <p:cNvPr id="209" name="Textfeld 208">
-            <a:extLst>
-              <a:ext uri="{FF2B5EF4-FFF2-40B4-BE49-F238E27FC236}">
-                <a16:creationId xmlns:a16="http://schemas.microsoft.com/office/drawing/2014/main" id="{2140523B-54F6-4710-922A-6B14489A9C8F}"/>
-              </a:ext>
-            </a:extLst>
-          </p:cNvPr>
-          <p:cNvSpPr txBox="1"/>
-          <p:nvPr/>
-        </p:nvSpPr>
-        <p:spPr>
-          <a:xfrm>
-            <a:off x="9757543" y="1677915"/>
-            <a:ext cx="819969" cy="400110"/>
-          </a:xfrm>
-          <a:prstGeom prst="rect">
-            <a:avLst/>
-          </a:prstGeom>
-          <a:noFill/>
-        </p:spPr>
-        <p:txBody>
-          <a:bodyPr wrap="square" rtlCol="0">
-            <a:spAutoFit/>
-          </a:bodyPr>
-          <a:lstStyle/>
-          <a:p>
-            <a:pPr algn="ctr"/>
-            <a:r>
-              <a:rPr lang="de-CH" sz="1000" b="1" dirty="0"/>
-              <a:t>Ampel</a:t>
-            </a:r>
-            <a:br>
-              <a:rPr lang="de-CH" sz="1000" b="1" dirty="0"/>
-            </a:br>
-            <a:r>
-              <a:rPr lang="de-CH" sz="1000" b="1" dirty="0"/>
-              <a:t>für Autos</a:t>
-            </a:r>
-          </a:p>
-        </p:txBody>
-      </p:sp>
-      <p:sp>
-        <p:nvSpPr>
-          <p:cNvPr id="210" name="Textfeld 209">
-            <a:extLst>
-              <a:ext uri="{FF2B5EF4-FFF2-40B4-BE49-F238E27FC236}">
-                <a16:creationId xmlns:a16="http://schemas.microsoft.com/office/drawing/2014/main" id="{2DC40D92-80FF-4697-91B5-197946C1BBB6}"/>
-              </a:ext>
-            </a:extLst>
-          </p:cNvPr>
-          <p:cNvSpPr txBox="1"/>
-          <p:nvPr/>
-        </p:nvSpPr>
-        <p:spPr>
-          <a:xfrm>
-            <a:off x="9741432" y="3965708"/>
-            <a:ext cx="954364" cy="400110"/>
-          </a:xfrm>
-          <a:prstGeom prst="rect">
-            <a:avLst/>
-          </a:prstGeom>
-          <a:noFill/>
-        </p:spPr>
-        <p:txBody>
-          <a:bodyPr wrap="square" rtlCol="0">
-            <a:spAutoFit/>
-          </a:bodyPr>
-          <a:lstStyle/>
-          <a:p>
-            <a:pPr algn="ctr"/>
-            <a:r>
-              <a:rPr lang="de-CH" sz="1000" b="1" dirty="0"/>
-              <a:t>Ampel für Fussgänger</a:t>
-            </a:r>
-          </a:p>
-        </p:txBody>
-      </p:sp>
-      <p:sp>
-        <p:nvSpPr>
-          <p:cNvPr id="211" name="Textfeld 210">
-            <a:extLst>
-              <a:ext uri="{FF2B5EF4-FFF2-40B4-BE49-F238E27FC236}">
-                <a16:creationId xmlns:a16="http://schemas.microsoft.com/office/drawing/2014/main" id="{74589D10-FDE2-4DFA-AF13-11D3F551D0A2}"/>
-              </a:ext>
-            </a:extLst>
-          </p:cNvPr>
-          <p:cNvSpPr txBox="1"/>
-          <p:nvPr/>
-        </p:nvSpPr>
-        <p:spPr>
-          <a:xfrm>
-            <a:off x="9721659" y="4854032"/>
-            <a:ext cx="954364" cy="338554"/>
-          </a:xfrm>
-          <a:prstGeom prst="rect">
-            <a:avLst/>
-          </a:prstGeom>
-          <a:noFill/>
-        </p:spPr>
-        <p:txBody>
-          <a:bodyPr wrap="square" rtlCol="0">
-            <a:spAutoFit/>
-          </a:bodyPr>
-          <a:lstStyle/>
-          <a:p>
-            <a:pPr algn="ctr"/>
-            <a:r>
-              <a:rPr lang="de-CH" sz="800" dirty="0"/>
-              <a:t>Knopf für Grünanforderung</a:t>
-            </a:r>
-          </a:p>
-        </p:txBody>
-      </p:sp>
-      <p:sp>
-        <p:nvSpPr>
-          <p:cNvPr id="212" name="Textfeld 211">
-            <a:extLst>
-              <a:ext uri="{FF2B5EF4-FFF2-40B4-BE49-F238E27FC236}">
-                <a16:creationId xmlns:a16="http://schemas.microsoft.com/office/drawing/2014/main" id="{6DEDAC23-4DC1-4053-ADC7-73F82FF8C284}"/>
-              </a:ext>
-            </a:extLst>
-          </p:cNvPr>
-          <p:cNvSpPr txBox="1"/>
-          <p:nvPr/>
-        </p:nvSpPr>
-        <p:spPr>
-          <a:xfrm>
-            <a:off x="3777015" y="6140242"/>
-            <a:ext cx="663327" cy="215444"/>
-          </a:xfrm>
-          <a:prstGeom prst="rect">
-            <a:avLst/>
-          </a:prstGeom>
-          <a:noFill/>
-        </p:spPr>
-        <p:txBody>
-          <a:bodyPr wrap="square" rtlCol="0">
-            <a:spAutoFit/>
-          </a:bodyPr>
-          <a:lstStyle/>
-          <a:p>
-            <a:pPr algn="ctr"/>
-            <a:r>
-              <a:rPr lang="de-CH" sz="800" dirty="0"/>
-              <a:t>9V Batterie</a:t>
-            </a:r>
-          </a:p>
-        </p:txBody>
-      </p:sp>
-      <p:sp>
-        <p:nvSpPr>
-          <p:cNvPr id="213" name="Textfeld 212">
-            <a:extLst>
-              <a:ext uri="{FF2B5EF4-FFF2-40B4-BE49-F238E27FC236}">
-                <a16:creationId xmlns:a16="http://schemas.microsoft.com/office/drawing/2014/main" id="{B114BD1E-7708-4DC5-9D93-BC2B52D7CADA}"/>
-              </a:ext>
-            </a:extLst>
-          </p:cNvPr>
-          <p:cNvSpPr txBox="1"/>
-          <p:nvPr/>
-        </p:nvSpPr>
-        <p:spPr>
-          <a:xfrm>
-            <a:off x="5596866" y="4109443"/>
-            <a:ext cx="940770" cy="338554"/>
-          </a:xfrm>
-          <a:prstGeom prst="rect">
-            <a:avLst/>
-          </a:prstGeom>
-          <a:noFill/>
-        </p:spPr>
-        <p:txBody>
-          <a:bodyPr wrap="square" rtlCol="0">
-            <a:spAutoFit/>
-          </a:bodyPr>
-          <a:lstStyle/>
-          <a:p>
-            <a:pPr algn="ctr"/>
-            <a:r>
-              <a:rPr lang="de-CH" sz="800" b="1" dirty="0"/>
-              <a:t>Arduino</a:t>
-            </a:r>
-          </a:p>
-          <a:p>
-            <a:pPr algn="ctr"/>
-            <a:r>
-              <a:rPr lang="de-CH" sz="800" b="1" dirty="0"/>
-              <a:t>Ampelsteuerung</a:t>
-            </a:r>
-          </a:p>
-        </p:txBody>
-      </p:sp>
-      <p:sp>
-        <p:nvSpPr>
-          <p:cNvPr id="214" name="Textfeld 213">
-            <a:extLst>
-              <a:ext uri="{FF2B5EF4-FFF2-40B4-BE49-F238E27FC236}">
-                <a16:creationId xmlns:a16="http://schemas.microsoft.com/office/drawing/2014/main" id="{502BDBFA-24AB-48F1-9F96-39E0FFBC58DA}"/>
-              </a:ext>
-            </a:extLst>
-          </p:cNvPr>
-          <p:cNvSpPr txBox="1"/>
-          <p:nvPr/>
-        </p:nvSpPr>
-        <p:spPr>
-          <a:xfrm>
-            <a:off x="5596016" y="1631237"/>
-            <a:ext cx="940770" cy="215444"/>
-          </a:xfrm>
-          <a:prstGeom prst="rect">
-            <a:avLst/>
-          </a:prstGeom>
-          <a:noFill/>
-        </p:spPr>
-        <p:txBody>
-          <a:bodyPr wrap="square" rtlCol="0">
-            <a:spAutoFit/>
-          </a:bodyPr>
-          <a:lstStyle/>
-          <a:p>
-            <a:pPr algn="ctr"/>
-            <a:r>
-              <a:rPr lang="de-CH" sz="800" dirty="0"/>
-              <a:t>RESET-Knopf</a:t>
-            </a:r>
-          </a:p>
-        </p:txBody>
-      </p:sp>
-      <p:cxnSp>
-        <p:nvCxnSpPr>
-          <p:cNvPr id="160" name="Gerade Verbindung mit Pfeil 159">
-            <a:extLst>
-              <a:ext uri="{FF2B5EF4-FFF2-40B4-BE49-F238E27FC236}">
-                <a16:creationId xmlns:a16="http://schemas.microsoft.com/office/drawing/2014/main" id="{6FBBD216-F34B-409C-B2A3-EBFECFDEC32F}"/>
-              </a:ext>
-            </a:extLst>
-          </p:cNvPr>
-          <p:cNvCxnSpPr/>
-          <p:nvPr/>
-        </p:nvCxnSpPr>
-        <p:spPr>
-          <a:xfrm>
-            <a:off x="6066401" y="1813682"/>
-            <a:ext cx="0" cy="284027"/>
-          </a:xfrm>
-          <a:prstGeom prst="straightConnector1">
-            <a:avLst/>
-          </a:prstGeom>
-          <a:ln>
-            <a:tailEnd type="triangle"/>
-          </a:ln>
-        </p:spPr>
-        <p:style>
-          <a:lnRef idx="1">
-            <a:schemeClr val="accent1"/>
-          </a:lnRef>
-          <a:fillRef idx="0">
-            <a:schemeClr val="accent1"/>
-          </a:fillRef>
-          <a:effectRef idx="0">
-            <a:schemeClr val="accent1"/>
-          </a:effectRef>
-          <a:fontRef idx="minor">
-            <a:schemeClr val="tx1"/>
-          </a:fontRef>
-        </p:style>
-      </p:cxnSp>
-      <p:sp>
-        <p:nvSpPr>
-          <p:cNvPr id="220" name="Textfeld 219">
-            <a:extLst>
-              <a:ext uri="{FF2B5EF4-FFF2-40B4-BE49-F238E27FC236}">
-                <a16:creationId xmlns:a16="http://schemas.microsoft.com/office/drawing/2014/main" id="{F9E1FDB8-E5CC-4B57-B8BD-44ACB683799D}"/>
-              </a:ext>
-            </a:extLst>
-          </p:cNvPr>
-          <p:cNvSpPr txBox="1"/>
-          <p:nvPr/>
-        </p:nvSpPr>
-        <p:spPr>
-          <a:xfrm>
-            <a:off x="3978986" y="679221"/>
-            <a:ext cx="3833971" cy="400110"/>
-          </a:xfrm>
-          <a:prstGeom prst="rect">
-            <a:avLst/>
-          </a:prstGeom>
-          <a:noFill/>
-        </p:spPr>
-        <p:txBody>
-          <a:bodyPr wrap="square" rtlCol="0">
-            <a:spAutoFit/>
-          </a:bodyPr>
-          <a:lstStyle/>
-          <a:p>
-            <a:pPr algn="ctr"/>
-            <a:r>
-              <a:rPr lang="de-CH" sz="2000" b="1" u="sng" dirty="0"/>
-              <a:t>Fussgänger-Ampel</a:t>
-            </a:r>
+              <a:rPr lang="de-CH" sz="1400" u="sng" dirty="0"/>
+              <a:t>Funktionsweise</a:t>
+            </a:r>
+            <a:r>
+              <a:rPr lang="de-CH" sz="1400" dirty="0"/>
+              <a:t>:</a:t>
+            </a:r>
+          </a:p>
+          <a:p>
+            <a:endParaRPr lang="de-CH" sz="1400" dirty="0"/>
+          </a:p>
+          <a:p>
+            <a:r>
+              <a:rPr lang="de-CH" sz="1400" dirty="0"/>
+              <a:t>Beim Start (oder nach RESET) blinken beide Ampeln orange.</a:t>
+            </a:r>
+          </a:p>
+          <a:p>
+            <a:endParaRPr lang="de-CH" sz="1400" dirty="0"/>
+          </a:p>
+          <a:p>
+            <a:r>
+              <a:rPr lang="de-CH" sz="1400" dirty="0"/>
+              <a:t>Sobald der Knopf bei der Fussgängerampel gedrückt wird, schalten zuerst beide Ampeln auf rot, danach folgt die Grünphase (10 Sekunden) für Fussgänger.</a:t>
+            </a:r>
+          </a:p>
+          <a:p>
+            <a:r>
+              <a:rPr lang="de-CH" sz="1400" dirty="0"/>
+              <a:t>Danach stellt die Fussgängerampel auf rot und die Autos bekommen grün (zeitlich unbeschränkt).</a:t>
+            </a:r>
+          </a:p>
+          <a:p>
+            <a:endParaRPr lang="de-CH" sz="1400" dirty="0"/>
+          </a:p>
+          <a:p>
+            <a:r>
+              <a:rPr lang="de-CH" sz="1400" dirty="0"/>
+              <a:t>Bei erneutem Drücken des Knopfes erfolgt wieder eine Grünphase für die Fussgänger.</a:t>
+            </a:r>
+          </a:p>
+          <a:p>
+            <a:r>
+              <a:rPr lang="de-CH" sz="1400" dirty="0"/>
+              <a:t>Die Grünphase für Autos dauert jedoch mindestens 10 s (falls der Knopf zu früh gedrückt wird).</a:t>
+            </a:r>
+          </a:p>
+          <a:p>
+            <a:endParaRPr lang="de-CH" sz="1400" dirty="0"/>
+          </a:p>
+          <a:p>
+            <a:endParaRPr lang="de-CH" sz="1400" dirty="0"/>
+          </a:p>
+          <a:p>
+            <a:endParaRPr lang="de-CH" sz="1400" dirty="0"/>
+          </a:p>
+          <a:p>
+            <a:endParaRPr lang="de-CH" sz="1400" dirty="0"/>
+          </a:p>
+          <a:p>
+            <a:endParaRPr lang="de-CH" sz="1400" dirty="0"/>
           </a:p>
         </p:txBody>
       </p:sp>

</xml_diff>